<commit_message>
Final report (for now); Final poster
</commit_message>
<xml_diff>
--- a/BraveHeartsAR_poster.pptx
+++ b/BraveHeartsAR_poster.pptx
@@ -238,7 +238,7 @@
           <a:p>
             <a:fld id="{487C7CF5-2490-4B15-A7AF-9B621B3EFBAD}" type="datetimeFigureOut">
               <a:rPr lang="pt-PT" smtClean="0"/>
-              <a:t>09/07/2024</a:t>
+              <a:t>11/07/2024</a:t>
             </a:fld>
             <a:endParaRPr lang="pt-PT"/>
           </a:p>
@@ -3747,13 +3747,18 @@
         </p:blipFill>
         <p:spPr bwMode="auto">
           <a:xfrm>
-            <a:off x="121105" y="4926509"/>
-            <a:ext cx="4299562" cy="3051455"/>
+            <a:off x="8211424" y="2004746"/>
+            <a:ext cx="4389906" cy="3072453"/>
           </a:xfrm>
           <a:prstGeom prst="rect">
             <a:avLst/>
           </a:prstGeom>
           <a:noFill/>
+          <a:ln w="19050">
+            <a:solidFill>
+              <a:srgbClr val="165A69"/>
+            </a:solidFill>
+          </a:ln>
           <a:extLst>
             <a:ext uri="{909E8E84-426E-40DD-AFC4-6F175D3DCCD1}">
               <a14:hiddenFill xmlns:a14="http://schemas.microsoft.com/office/drawing/2010/main">
@@ -3777,27 +3782,27 @@
         </p:nvSpPr>
         <p:spPr>
           <a:xfrm>
-            <a:off x="77883" y="4668401"/>
-            <a:ext cx="3629695" cy="375320"/>
+            <a:off x="8084094" y="1614626"/>
+            <a:ext cx="4505736" cy="375320"/>
           </a:xfrm>
         </p:spPr>
         <p:txBody>
           <a:bodyPr/>
           <a:lstStyle/>
           <a:p>
-            <a:pPr marL="0" indent="0">
+            <a:pPr marL="0" indent="0" algn="ctr">
               <a:buClr>
                 <a:srgbClr val="D45500"/>
               </a:buClr>
               <a:buNone/>
             </a:pPr>
             <a:r>
-              <a:rPr lang="pt-PT" sz="2000" b="1" dirty="0">
+              <a:rPr lang="pt-PT" sz="2000" dirty="0">
                 <a:solidFill>
                   <a:srgbClr val="165A69"/>
                 </a:solidFill>
               </a:rPr>
-              <a:t>Diagrama do fluxo de jogo:</a:t>
+              <a:t>Diagrama do fluxo de jogo</a:t>
             </a:r>
             <a:br>
               <a:rPr lang="pt-PT" sz="1200" dirty="0"/>
@@ -3825,14 +3830,14 @@
             <p:ph sz="half" idx="2"/>
             <p:extLst>
               <p:ext uri="{D42A27DB-BD31-4B8C-83A1-F6EECF244321}">
-                <p14:modId xmlns:p14="http://schemas.microsoft.com/office/powerpoint/2010/main" val="3600542807"/>
+                <p14:modId xmlns:p14="http://schemas.microsoft.com/office/powerpoint/2010/main" val="1866525470"/>
               </p:ext>
             </p:extLst>
           </p:nvPr>
         </p:nvGraphicFramePr>
         <p:xfrm>
-          <a:off x="155575" y="1750362"/>
-          <a:ext cx="4181376" cy="2895600"/>
+          <a:off x="181536" y="1869703"/>
+          <a:ext cx="3696395" cy="3688080"/>
         </p:xfrm>
         <a:graphic>
           <a:graphicData uri="http://schemas.openxmlformats.org/drawingml/2006/table">
@@ -3841,7 +3846,7 @@
                 <a:tableStyleId>{5C22544A-7EE6-4342-B048-85BDC9FD1C3A}</a:tableStyleId>
               </a:tblPr>
               <a:tblGrid>
-                <a:gridCol w="4181376">
+                <a:gridCol w="3696395">
                   <a:extLst>
                     <a:ext uri="{9D8B030D-6E8A-4147-A177-3AD203B41FA5}">
                       <a16:colId xmlns:a16="http://schemas.microsoft.com/office/drawing/2014/main" val="1827561464"/>
@@ -3849,7 +3854,7 @@
                   </a:extLst>
                 </a:gridCol>
               </a:tblGrid>
-              <a:tr h="350002">
+              <a:tr h="358563">
                 <a:tc>
                   <a:txBody>
                     <a:bodyPr/>
@@ -3878,14 +3883,15 @@
                   </a:ext>
                 </a:extLst>
               </a:tr>
-              <a:tr h="1812338">
+              <a:tr h="3256952">
                 <a:tc>
                   <a:txBody>
                     <a:bodyPr/>
                     <a:lstStyle/>
                     <a:p>
+                      <a:pPr algn="just"/>
                       <a:r>
-                        <a:rPr lang="pt-PT" sz="800" kern="1200" dirty="0">
+                        <a:rPr lang="pt-PT" sz="1200" kern="1200" dirty="0">
                           <a:solidFill>
                             <a:schemeClr val="dk1"/>
                           </a:solidFill>
@@ -3894,12 +3900,25 @@
                           <a:ea typeface="+mn-ea"/>
                           <a:cs typeface="+mn-cs"/>
                         </a:rPr>
-                        <a:t>Atualmente, uma das preocupações no seio hospitalar prende-se com a fraca capacidade de gerir emoções, como a ansiedade, o medo e o stress, que os pacientes pediátricos apresentam, nos momentos pré e pós intervenção cirúrgica. </a:t>
+                        <a:t>Este projeto, tem como principal objetivo aliar a tecnologia de Realidade Aumentada (RA) à ludoterapia, uma estratégia amplamente utilizada para mitigar emoções como a ansiedade e o medo, sentidas por crianças no período pré operatório. </a:t>
                       </a:r>
                     </a:p>
                     <a:p>
+                      <a:pPr algn="just"/>
+                      <a:endParaRPr lang="pt-PT" sz="1200" kern="1200" dirty="0">
+                        <a:solidFill>
+                          <a:schemeClr val="dk1"/>
+                        </a:solidFill>
+                        <a:effectLst/>
+                        <a:latin typeface="+mn-lt"/>
+                        <a:ea typeface="+mn-ea"/>
+                        <a:cs typeface="+mn-cs"/>
+                      </a:endParaRPr>
+                    </a:p>
+                    <a:p>
+                      <a:pPr algn="just"/>
                       <a:r>
-                        <a:rPr lang="pt-PT" sz="800" kern="1200" dirty="0">
+                        <a:rPr lang="pt-PT" sz="1200" kern="1200" dirty="0">
                           <a:solidFill>
                             <a:schemeClr val="dk1"/>
                           </a:solidFill>
@@ -3908,12 +3927,25 @@
                           <a:ea typeface="+mn-ea"/>
                           <a:cs typeface="+mn-cs"/>
                         </a:rPr>
-                        <a:t>O presente projeto materializa, precisamente, uma aplicação da tecnologia para dar resposta a esta preocupação, com a qual são confrontadas inúmeras famílias anualmente. Devido às características únicas das crianças, existe a necessidade de desenvolver estratégias que permitam reduzir estas emoções negativas.</a:t>
+                        <a:t>Mais especificamente, proporcionar aos seus utilizadores experiências positivas de relaxamento, diversão e companheirismo, enquanto os educa sobre os procedimentos pré-cirúrgicos aos quais serão submetidos.</a:t>
                       </a:r>
                     </a:p>
                     <a:p>
+                      <a:pPr algn="just"/>
+                      <a:endParaRPr lang="pt-PT" sz="1200" kern="1200" dirty="0">
+                        <a:solidFill>
+                          <a:schemeClr val="dk1"/>
+                        </a:solidFill>
+                        <a:effectLst/>
+                        <a:latin typeface="+mn-lt"/>
+                        <a:ea typeface="+mn-ea"/>
+                        <a:cs typeface="+mn-cs"/>
+                      </a:endParaRPr>
+                    </a:p>
+                    <a:p>
+                      <a:pPr algn="just"/>
                       <a:r>
-                        <a:rPr lang="pt-PT" sz="800" kern="1200" dirty="0">
+                        <a:rPr lang="pt-PT" sz="1200" kern="1200" dirty="0">
                           <a:solidFill>
                             <a:schemeClr val="dk1"/>
                           </a:solidFill>
@@ -3922,12 +3954,10 @@
                           <a:ea typeface="+mn-ea"/>
                           <a:cs typeface="+mn-cs"/>
                         </a:rPr>
-                        <a:t>Neste seguimento, este projeto, tem como principal objetivo aliar a tecnologia de Realidade Aumentada (RA) à ludoterapia, uma estratégia amplamente utilizada para mitigar as emoções negativas, no caso concreto, adaptada às necessidades e características únicas das crianças, enquanto público-alvo. Deste modo, afigura-se perentório o desenvolvimento de um jogo com recurso à RA, que se apresente aos jogadores, neste caso, aos pacientes pediátricos, como uma ferramenta de redução das emoções negativas. Mais especificamente, proporcionar aos seus utilizadores experiências positivas de relaxamento, diversão e companheirismo, enquanto os educa sobre os procedimentos pré-cirúrgicos aos quais serão submetidos.</a:t>
+                        <a:t>O jogo foi desenvolvido através do </a:t>
                       </a:r>
-                    </a:p>
-                    <a:p>
                       <a:r>
-                        <a:rPr lang="pt-PT" sz="800" kern="1200" dirty="0">
+                        <a:rPr lang="pt-PT" sz="1200" i="1" kern="1200" dirty="0">
                           <a:solidFill>
                             <a:schemeClr val="dk1"/>
                           </a:solidFill>
@@ -3936,10 +3966,22 @@
                           <a:ea typeface="+mn-ea"/>
                           <a:cs typeface="+mn-cs"/>
                         </a:rPr>
-                        <a:t>O jogo foi desenvolvido através da plataforma </a:t>
+                        <a:t>software</a:t>
                       </a:r>
                       <a:r>
-                        <a:rPr lang="pt-PT" sz="800" kern="1200" dirty="0" err="1">
+                        <a:rPr lang="pt-PT" sz="1200" kern="1200" dirty="0">
+                          <a:solidFill>
+                            <a:schemeClr val="dk1"/>
+                          </a:solidFill>
+                          <a:effectLst/>
+                          <a:latin typeface="+mn-lt"/>
+                          <a:ea typeface="+mn-ea"/>
+                          <a:cs typeface="+mn-cs"/>
+                        </a:rPr>
+                        <a:t> </a:t>
+                      </a:r>
+                      <a:r>
+                        <a:rPr lang="pt-PT" sz="1200" kern="1200" dirty="0" err="1">
                           <a:solidFill>
                             <a:schemeClr val="dk1"/>
                           </a:solidFill>
@@ -3951,6 +3993,18 @@
                         <a:t>Unity</a:t>
                       </a:r>
                       <a:r>
+                        <a:rPr lang="pt-PT" sz="1200" kern="1200" dirty="0">
+                          <a:solidFill>
+                            <a:schemeClr val="dk1"/>
+                          </a:solidFill>
+                          <a:effectLst/>
+                          <a:latin typeface="+mn-lt"/>
+                          <a:ea typeface="+mn-ea"/>
+                          <a:cs typeface="+mn-cs"/>
+                        </a:rPr>
+                        <a:t> e é constituído por uma introdução, um jogo de memória focado na vertente lúdica, minijogos concentrados na aprendizagem de três processos pré-cirúrgicos e uma finalização</a:t>
+                      </a:r>
+                      <a:r>
                         <a:rPr lang="pt-PT" sz="800" kern="1200" dirty="0">
                           <a:solidFill>
                             <a:schemeClr val="dk1"/>
@@ -3960,8 +4014,20 @@
                           <a:ea typeface="+mn-ea"/>
                           <a:cs typeface="+mn-cs"/>
                         </a:rPr>
-                        <a:t>, idealizado para dispositivos móveis, e, como tal, possui uma interface eminentemente intuitiva. Nesta senda, o jogo é constituído por uma introdução, um jogo de memória focado na vertente lúdica e minijogos concentrados na aprendizagem de três processos pré-cirúrgicos.</a:t>
+                        <a:t>.</a:t>
                       </a:r>
+                    </a:p>
+                    <a:p>
+                      <a:pPr algn="just"/>
+                      <a:endParaRPr lang="pt-PT" sz="800" kern="1200" dirty="0">
+                        <a:solidFill>
+                          <a:schemeClr val="dk1"/>
+                        </a:solidFill>
+                        <a:effectLst/>
+                        <a:latin typeface="+mn-lt"/>
+                        <a:ea typeface="+mn-ea"/>
+                        <a:cs typeface="+mn-cs"/>
+                      </a:endParaRPr>
                     </a:p>
                   </a:txBody>
                   <a:tcPr/>
@@ -4210,7 +4276,7 @@
         </p:nvSpPr>
         <p:spPr>
           <a:xfrm>
-            <a:off x="639760" y="609357"/>
+            <a:off x="702888" y="624899"/>
             <a:ext cx="11522075" cy="1600200"/>
           </a:xfrm>
         </p:spPr>
@@ -4219,7 +4285,7 @@
           <a:lstStyle/>
           <a:p>
             <a:r>
-              <a:rPr lang="pt-PT" sz="2800" b="1" dirty="0" err="1">
+              <a:rPr lang="pt-PT" sz="2400" b="1" dirty="0" err="1">
                 <a:solidFill>
                   <a:srgbClr val="165A69"/>
                 </a:solidFill>
@@ -4227,18 +4293,28 @@
               <a:t>BraveHearts</a:t>
             </a:r>
             <a:r>
-              <a:rPr lang="pt-PT" sz="2800" b="1" dirty="0">
+              <a:rPr lang="pt-PT" sz="2400" b="1" dirty="0">
                 <a:solidFill>
                   <a:srgbClr val="165A69"/>
                 </a:solidFill>
               </a:rPr>
               <a:t> AR – Diminuir o Medo na Cirurgia pediátrica</a:t>
             </a:r>
-            <a:endParaRPr lang="pt-PT" sz="1800" b="1" dirty="0">
-              <a:solidFill>
-                <a:schemeClr val="tx1"/>
-              </a:solidFill>
-            </a:endParaRPr>
+            <a:br>
+              <a:rPr lang="pt-PT" sz="2400" b="1" dirty="0">
+                <a:solidFill>
+                  <a:srgbClr val="165A69"/>
+                </a:solidFill>
+              </a:rPr>
+            </a:br>
+            <a:r>
+              <a:rPr lang="pt-PT" sz="1800" b="1" dirty="0">
+                <a:solidFill>
+                  <a:schemeClr val="tx1"/>
+                </a:solidFill>
+              </a:rPr>
+              <a:t>Ricardo Silvério | Ricardo Pereira</a:t>
+            </a:r>
           </a:p>
         </p:txBody>
       </p:sp>
@@ -4257,14 +4333,14 @@
           <p:nvPr>
             <p:extLst>
               <p:ext uri="{D42A27DB-BD31-4B8C-83A1-F6EECF244321}">
-                <p14:modId xmlns:p14="http://schemas.microsoft.com/office/powerpoint/2010/main" val="1227079161"/>
+                <p14:modId xmlns:p14="http://schemas.microsoft.com/office/powerpoint/2010/main" val="1466938223"/>
               </p:ext>
             </p:extLst>
           </p:nvPr>
         </p:nvGraphicFramePr>
         <p:xfrm>
-          <a:off x="4555900" y="1750363"/>
-          <a:ext cx="2635084" cy="1610317"/>
+          <a:off x="163024" y="5641751"/>
+          <a:ext cx="3689432" cy="2375486"/>
         </p:xfrm>
         <a:graphic>
           <a:graphicData uri="http://schemas.openxmlformats.org/drawingml/2006/table">
@@ -4273,7 +4349,7 @@
                 <a:tableStyleId>{5C22544A-7EE6-4342-B048-85BDC9FD1C3A}</a:tableStyleId>
               </a:tblPr>
               <a:tblGrid>
-                <a:gridCol w="2635084">
+                <a:gridCol w="3689432">
                   <a:extLst>
                     <a:ext uri="{9D8B030D-6E8A-4147-A177-3AD203B41FA5}">
                       <a16:colId xmlns:a16="http://schemas.microsoft.com/office/drawing/2014/main" val="1827561464"/>
@@ -4281,7 +4357,7 @@
                   </a:extLst>
                 </a:gridCol>
               </a:tblGrid>
-              <a:tr h="354856">
+              <a:tr h="380078">
                 <a:tc>
                   <a:txBody>
                     <a:bodyPr/>
@@ -4310,18 +4386,18 @@
                   </a:ext>
                 </a:extLst>
               </a:tr>
-              <a:tr h="1244557">
+              <a:tr h="1995408">
                 <a:tc>
                   <a:txBody>
                     <a:bodyPr/>
                     <a:lstStyle/>
                     <a:p>
-                      <a:pPr marL="171450" indent="-171450">
+                      <a:pPr marL="171450" indent="-171450" algn="just">
                         <a:buFont typeface="Arial" panose="020B0604020202020204" pitchFamily="34" charset="0"/>
                         <a:buChar char="•"/>
                       </a:pPr>
                       <a:r>
-                        <a:rPr lang="pt-PT" sz="800" kern="1200" dirty="0">
+                        <a:rPr lang="pt-PT" sz="1200" kern="1200" dirty="0">
                           <a:solidFill>
                             <a:schemeClr val="dk1"/>
                           </a:solidFill>
@@ -4330,16 +4406,31 @@
                           <a:ea typeface="+mn-ea"/>
                           <a:cs typeface="+mn-cs"/>
                         </a:rPr>
-                        <a:t>Implementação de um jogo de memória com recurso a cartas físicas, que contem marcadores e ao serem detetados revelam os modelos 3D associados</a:t>
+                        <a:t>Implementação de um jogo de memória com recurso a marcadores físicos que, ao serem detetados, revelam os modelos 3D associados.</a:t>
                       </a:r>
                     </a:p>
                     <a:p>
-                      <a:pPr marL="171450" indent="-171450">
+                      <a:pPr marL="171450" indent="-171450" algn="just">
+                        <a:buFont typeface="Arial" panose="020B0604020202020204" pitchFamily="34" charset="0"/>
+                        <a:buChar char="•"/>
+                      </a:pPr>
+                      <a:endParaRPr lang="pt-PT" sz="1200" kern="1200" dirty="0">
+                        <a:solidFill>
+                          <a:schemeClr val="dk1"/>
+                        </a:solidFill>
+                        <a:effectLst/>
+                        <a:latin typeface="+mn-lt"/>
+                        <a:ea typeface="+mn-ea"/>
+                        <a:cs typeface="+mn-cs"/>
+                      </a:endParaRPr>
+                    </a:p>
+                    <a:p>
+                      <a:pPr marL="171450" indent="-171450" algn="just">
                         <a:buFont typeface="Arial" panose="020B0604020202020204" pitchFamily="34" charset="0"/>
                         <a:buChar char="•"/>
                       </a:pPr>
                       <a:r>
-                        <a:rPr lang="pt-PT" sz="800" kern="1200" dirty="0">
+                        <a:rPr lang="pt-PT" sz="1200" kern="1200" dirty="0">
                           <a:solidFill>
                             <a:schemeClr val="dk1"/>
                           </a:solidFill>
@@ -4348,16 +4439,31 @@
                           <a:ea typeface="+mn-ea"/>
                           <a:cs typeface="+mn-cs"/>
                         </a:rPr>
-                        <a:t>Explicação e demonstração clara, interativa e simplificada dos procedimentos médicos com utilização de realidade aumentada</a:t>
+                        <a:t>Explicação e demonstração simplificada e interativa dos procedimentos médicos com utilização de Realidade Aumentada</a:t>
                       </a:r>
                     </a:p>
                     <a:p>
-                      <a:pPr marL="171450" indent="-171450">
+                      <a:pPr marL="171450" indent="-171450" algn="just">
+                        <a:buFont typeface="Arial" panose="020B0604020202020204" pitchFamily="34" charset="0"/>
+                        <a:buChar char="•"/>
+                      </a:pPr>
+                      <a:endParaRPr lang="pt-PT" sz="1200" kern="1200" dirty="0">
+                        <a:solidFill>
+                          <a:schemeClr val="dk1"/>
+                        </a:solidFill>
+                        <a:effectLst/>
+                        <a:latin typeface="+mn-lt"/>
+                        <a:ea typeface="+mn-ea"/>
+                        <a:cs typeface="+mn-cs"/>
+                      </a:endParaRPr>
+                    </a:p>
+                    <a:p>
+                      <a:pPr marL="171450" indent="-171450" algn="just">
                         <a:buFont typeface="Arial" panose="020B0604020202020204" pitchFamily="34" charset="0"/>
                         <a:buChar char="•"/>
                       </a:pPr>
                       <a:r>
-                        <a:rPr lang="pt-PT" sz="800" kern="1200" dirty="0">
+                        <a:rPr lang="pt-PT" sz="1200" kern="1200" dirty="0">
                           <a:solidFill>
                             <a:schemeClr val="dk1"/>
                           </a:solidFill>
@@ -4367,529 +4473,6 @@
                           <a:cs typeface="+mn-cs"/>
                         </a:rPr>
                         <a:t>Interface de utilizador intuitiva e adaptada para crianças</a:t>
-                      </a:r>
-                    </a:p>
-                  </a:txBody>
-                  <a:tcPr/>
-                </a:tc>
-                <a:extLst>
-                  <a:ext uri="{0D108BD9-81ED-4DB2-BD59-A6C34878D82A}">
-                    <a16:rowId xmlns:a16="http://schemas.microsoft.com/office/drawing/2014/main" val="1410093574"/>
-                  </a:ext>
-                </a:extLst>
-              </a:tr>
-            </a:tbl>
-          </a:graphicData>
-        </a:graphic>
-      </p:graphicFrame>
-      <p:graphicFrame>
-        <p:nvGraphicFramePr>
-          <p:cNvPr id="15" name="Marcador de Posição de Conteúdo 9">
-            <a:extLst>
-              <a:ext uri="{FF2B5EF4-FFF2-40B4-BE49-F238E27FC236}">
-                <a16:creationId xmlns:a16="http://schemas.microsoft.com/office/drawing/2014/main" id="{AA038E55-0029-705D-AE4F-E854BAD899C5}"/>
-              </a:ext>
-            </a:extLst>
-          </p:cNvPr>
-          <p:cNvGraphicFramePr>
-            <a:graphicFrameLocks/>
-          </p:cNvGraphicFramePr>
-          <p:nvPr>
-            <p:extLst>
-              <p:ext uri="{D42A27DB-BD31-4B8C-83A1-F6EECF244321}">
-                <p14:modId xmlns:p14="http://schemas.microsoft.com/office/powerpoint/2010/main" val="3358714750"/>
-              </p:ext>
-            </p:extLst>
-          </p:nvPr>
-        </p:nvGraphicFramePr>
-        <p:xfrm>
-          <a:off x="7330091" y="1750362"/>
-          <a:ext cx="5315933" cy="1195647"/>
-        </p:xfrm>
-        <a:graphic>
-          <a:graphicData uri="http://schemas.openxmlformats.org/drawingml/2006/table">
-            <a:tbl>
-              <a:tblPr firstRow="1" bandRow="1">
-                <a:tableStyleId>{5C22544A-7EE6-4342-B048-85BDC9FD1C3A}</a:tableStyleId>
-              </a:tblPr>
-              <a:tblGrid>
-                <a:gridCol w="5315933">
-                  <a:extLst>
-                    <a:ext uri="{9D8B030D-6E8A-4147-A177-3AD203B41FA5}">
-                      <a16:colId xmlns:a16="http://schemas.microsoft.com/office/drawing/2014/main" val="1827561464"/>
-                    </a:ext>
-                  </a:extLst>
-                </a:gridCol>
-              </a:tblGrid>
-              <a:tr h="321246">
-                <a:tc>
-                  <a:txBody>
-                    <a:bodyPr/>
-                    <a:lstStyle/>
-                    <a:p>
-                      <a:pPr algn="ctr"/>
-                      <a:r>
-                        <a:rPr lang="pt-PT" dirty="0">
-                          <a:solidFill>
-                            <a:schemeClr val="bg1"/>
-                          </a:solidFill>
-                        </a:rPr>
-                        <a:t>Jogo de memória</a:t>
-                      </a:r>
-                    </a:p>
-                  </a:txBody>
-                  <a:tcPr>
-                    <a:solidFill>
-                      <a:srgbClr val="165A69"/>
-                    </a:solidFill>
-                  </a:tcPr>
-                </a:tc>
-                <a:extLst>
-                  <a:ext uri="{0D108BD9-81ED-4DB2-BD59-A6C34878D82A}">
-                    <a16:rowId xmlns:a16="http://schemas.microsoft.com/office/drawing/2014/main" val="2317877568"/>
-                  </a:ext>
-                </a:extLst>
-              </a:tr>
-              <a:tr h="829887">
-                <a:tc>
-                  <a:txBody>
-                    <a:bodyPr/>
-                    <a:lstStyle/>
-                    <a:p>
-                      <a:pPr marL="0" indent="0">
-                        <a:buFont typeface="Arial" panose="020B0604020202020204" pitchFamily="34" charset="0"/>
-                        <a:buNone/>
-                      </a:pPr>
-                      <a:r>
-                        <a:rPr lang="pt-PT" sz="800" kern="1200" dirty="0">
-                          <a:solidFill>
-                            <a:schemeClr val="dk1"/>
-                          </a:solidFill>
-                          <a:effectLst/>
-                          <a:latin typeface="+mn-lt"/>
-                          <a:ea typeface="+mn-ea"/>
-                          <a:cs typeface="+mn-cs"/>
-                        </a:rPr>
-                        <a:t>A inovação, que diferencia o jogo desenvolvido de um tradicional jogo de memória, é a introdução da tecnologia de realidade aumentada. Quando o jogador vira as cartas, para tentar encontrar os pares, não conseguirá obter uma perceção dos resultados, uma vez que as cartas são todas diferentes. Para completar o jogo, com sucesso, o jogador precisa de usar a câmara do dispositivo móvel, apontando-a para os marcadores presentes na parte inferior de cada carta, de modo a revelar os animais associados a cada marcador. Ao reconhecer o padrão, o jogo interpretará o marcador e irá exibir o modelo do animal associado em cima da carta física.</a:t>
-                      </a:r>
-                    </a:p>
-                  </a:txBody>
-                  <a:tcPr/>
-                </a:tc>
-                <a:extLst>
-                  <a:ext uri="{0D108BD9-81ED-4DB2-BD59-A6C34878D82A}">
-                    <a16:rowId xmlns:a16="http://schemas.microsoft.com/office/drawing/2014/main" val="1410093574"/>
-                  </a:ext>
-                </a:extLst>
-              </a:tr>
-            </a:tbl>
-          </a:graphicData>
-        </a:graphic>
-      </p:graphicFrame>
-      <p:pic>
-        <p:nvPicPr>
-          <p:cNvPr id="1032" name="Picture 8">
-            <a:extLst>
-              <a:ext uri="{FF2B5EF4-FFF2-40B4-BE49-F238E27FC236}">
-                <a16:creationId xmlns:a16="http://schemas.microsoft.com/office/drawing/2014/main" id="{18F7CFF7-AAC9-5205-BC61-EA7AEE6954DD}"/>
-              </a:ext>
-            </a:extLst>
-          </p:cNvPr>
-          <p:cNvPicPr>
-            <a:picLocks noChangeAspect="1" noChangeArrowheads="1"/>
-          </p:cNvPicPr>
-          <p:nvPr/>
-        </p:nvPicPr>
-        <p:blipFill>
-          <a:blip r:embed="rId6" cstate="print">
-            <a:extLst>
-              <a:ext uri="{28A0092B-C50C-407E-A947-70E740481C1C}">
-                <a14:useLocalDpi xmlns:a14="http://schemas.microsoft.com/office/drawing/2010/main" val="0"/>
-              </a:ext>
-            </a:extLst>
-          </a:blip>
-          <a:srcRect/>
-          <a:stretch>
-            <a:fillRect/>
-          </a:stretch>
-        </p:blipFill>
-        <p:spPr bwMode="auto">
-          <a:xfrm>
-            <a:off x="7326216" y="3063696"/>
-            <a:ext cx="2389665" cy="883540"/>
-          </a:xfrm>
-          <a:prstGeom prst="rect">
-            <a:avLst/>
-          </a:prstGeom>
-          <a:noFill/>
-          <a:extLst>
-            <a:ext uri="{909E8E84-426E-40DD-AFC4-6F175D3DCCD1}">
-              <a14:hiddenFill xmlns:a14="http://schemas.microsoft.com/office/drawing/2010/main">
-                <a:solidFill>
-                  <a:srgbClr val="FFFFFF"/>
-                </a:solidFill>
-              </a14:hiddenFill>
-            </a:ext>
-          </a:extLst>
-        </p:spPr>
-      </p:pic>
-      <p:pic>
-        <p:nvPicPr>
-          <p:cNvPr id="16" name="Imagem 15" descr="A group of butterflies on papers&#10;&#10;Description automatically generated">
-            <a:extLst>
-              <a:ext uri="{FF2B5EF4-FFF2-40B4-BE49-F238E27FC236}">
-                <a16:creationId xmlns:a16="http://schemas.microsoft.com/office/drawing/2014/main" id="{D78449AB-0F49-2D3C-7FD6-05894C1A4E3D}"/>
-              </a:ext>
-            </a:extLst>
-          </p:cNvPr>
-          <p:cNvPicPr>
-            <a:picLocks noChangeAspect="1"/>
-          </p:cNvPicPr>
-          <p:nvPr/>
-        </p:nvPicPr>
-        <p:blipFill>
-          <a:blip r:embed="rId7" cstate="print">
-            <a:extLst>
-              <a:ext uri="{28A0092B-C50C-407E-A947-70E740481C1C}">
-                <a14:useLocalDpi xmlns:a14="http://schemas.microsoft.com/office/drawing/2010/main" val="0"/>
-              </a:ext>
-            </a:extLst>
-          </a:blip>
-          <a:srcRect/>
-          <a:stretch>
-            <a:fillRect/>
-          </a:stretch>
-        </p:blipFill>
-        <p:spPr bwMode="auto">
-          <a:xfrm>
-            <a:off x="11232362" y="3029819"/>
-            <a:ext cx="1408440" cy="883540"/>
-          </a:xfrm>
-          <a:prstGeom prst="rect">
-            <a:avLst/>
-          </a:prstGeom>
-          <a:noFill/>
-          <a:ln>
-            <a:noFill/>
-          </a:ln>
-        </p:spPr>
-      </p:pic>
-      <p:graphicFrame>
-        <p:nvGraphicFramePr>
-          <p:cNvPr id="17" name="Marcador de Posição de Conteúdo 9">
-            <a:extLst>
-              <a:ext uri="{FF2B5EF4-FFF2-40B4-BE49-F238E27FC236}">
-                <a16:creationId xmlns:a16="http://schemas.microsoft.com/office/drawing/2014/main" id="{3E2CB2EF-EDEF-FD40-9E4D-F550D66F04F7}"/>
-              </a:ext>
-            </a:extLst>
-          </p:cNvPr>
-          <p:cNvGraphicFramePr>
-            <a:graphicFrameLocks/>
-          </p:cNvGraphicFramePr>
-          <p:nvPr>
-            <p:extLst>
-              <p:ext uri="{D42A27DB-BD31-4B8C-83A1-F6EECF244321}">
-                <p14:modId xmlns:p14="http://schemas.microsoft.com/office/powerpoint/2010/main" val="1048803290"/>
-              </p:ext>
-            </p:extLst>
-          </p:nvPr>
-        </p:nvGraphicFramePr>
-        <p:xfrm>
-          <a:off x="7326216" y="4034560"/>
-          <a:ext cx="5315933" cy="1676400"/>
-        </p:xfrm>
-        <a:graphic>
-          <a:graphicData uri="http://schemas.openxmlformats.org/drawingml/2006/table">
-            <a:tbl>
-              <a:tblPr firstRow="1" bandRow="1">
-                <a:tableStyleId>{5C22544A-7EE6-4342-B048-85BDC9FD1C3A}</a:tableStyleId>
-              </a:tblPr>
-              <a:tblGrid>
-                <a:gridCol w="5315933">
-                  <a:extLst>
-                    <a:ext uri="{9D8B030D-6E8A-4147-A177-3AD203B41FA5}">
-                      <a16:colId xmlns:a16="http://schemas.microsoft.com/office/drawing/2014/main" val="1827561464"/>
-                    </a:ext>
-                  </a:extLst>
-                </a:gridCol>
-              </a:tblGrid>
-              <a:tr h="182880">
-                <a:tc>
-                  <a:txBody>
-                    <a:bodyPr/>
-                    <a:lstStyle/>
-                    <a:p>
-                      <a:pPr algn="ctr"/>
-                      <a:r>
-                        <a:rPr lang="pt-PT" dirty="0">
-                          <a:solidFill>
-                            <a:schemeClr val="bg1"/>
-                          </a:solidFill>
-                        </a:rPr>
-                        <a:t>Minijogos</a:t>
-                      </a:r>
-                    </a:p>
-                  </a:txBody>
-                  <a:tcPr>
-                    <a:solidFill>
-                      <a:srgbClr val="165A69"/>
-                    </a:solidFill>
-                  </a:tcPr>
-                </a:tc>
-                <a:extLst>
-                  <a:ext uri="{0D108BD9-81ED-4DB2-BD59-A6C34878D82A}">
-                    <a16:rowId xmlns:a16="http://schemas.microsoft.com/office/drawing/2014/main" val="2317877568"/>
-                  </a:ext>
-                </a:extLst>
-              </a:tr>
-              <a:tr h="533400">
-                <a:tc>
-                  <a:txBody>
-                    <a:bodyPr/>
-                    <a:lstStyle/>
-                    <a:p>
-                      <a:pPr marL="0" indent="0">
-                        <a:buFont typeface="Arial" panose="020B0604020202020204" pitchFamily="34" charset="0"/>
-                        <a:buNone/>
-                      </a:pPr>
-                      <a:r>
-                        <a:rPr lang="pt-PT" sz="800" kern="1200" dirty="0">
-                          <a:solidFill>
-                            <a:schemeClr val="dk1"/>
-                          </a:solidFill>
-                          <a:effectLst/>
-                          <a:latin typeface="+mn-lt"/>
-                          <a:ea typeface="+mn-ea"/>
-                          <a:cs typeface="+mn-cs"/>
-                        </a:rPr>
-                        <a:t>Existem três minijogos, cada um representativo de um procedimento médico específico. Os procedimentos representados foram, cuidadosamente, escolhidos pelas enfermeiras do Hospital de Leiria, visando preparar as crianças para as experiências que irão vivenciar. O primeiro minijogo ensina como se procede à aplicação do penso EMLA e da pomada analgésica, o segundo aborda a aplicação do garrote, e o terceiro explica a inserção do cateter. Ainda com a ajuda das enfermeiras foi criada uma metáfora entre os animais descobertos no jogo de memória e à sensação associada a cada procedimento. Dado que o público-alvo do jogo são crianças, procurou-se ao máximo reduzir o número de mecânicas necessárias para completar os minijogos, garantindo que a explicação dos procedimentos fosse facilmente absorvida. As ações necessárias para completar os minijogos variam entre: carregar nos objetos, arrastar os objetos para determinados locais e carregar repetidamente nesses mesmos objetos. </a:t>
-                      </a:r>
-                    </a:p>
-                  </a:txBody>
-                  <a:tcPr/>
-                </a:tc>
-                <a:extLst>
-                  <a:ext uri="{0D108BD9-81ED-4DB2-BD59-A6C34878D82A}">
-                    <a16:rowId xmlns:a16="http://schemas.microsoft.com/office/drawing/2014/main" val="1410093574"/>
-                  </a:ext>
-                </a:extLst>
-              </a:tr>
-            </a:tbl>
-          </a:graphicData>
-        </a:graphic>
-      </p:graphicFrame>
-      <p:pic>
-        <p:nvPicPr>
-          <p:cNvPr id="18" name="Imagem 17" descr="A cartoon hand with a syringe&#10;&#10;Description automatically generated">
-            <a:extLst>
-              <a:ext uri="{FF2B5EF4-FFF2-40B4-BE49-F238E27FC236}">
-                <a16:creationId xmlns:a16="http://schemas.microsoft.com/office/drawing/2014/main" id="{47BA67E7-116B-5E07-26C5-4369545AE056}"/>
-              </a:ext>
-            </a:extLst>
-          </p:cNvPr>
-          <p:cNvPicPr>
-            <a:picLocks noChangeAspect="1"/>
-          </p:cNvPicPr>
-          <p:nvPr/>
-        </p:nvPicPr>
-        <p:blipFill>
-          <a:blip r:embed="rId8" cstate="print">
-            <a:extLst>
-              <a:ext uri="{28A0092B-C50C-407E-A947-70E740481C1C}">
-                <a14:useLocalDpi xmlns:a14="http://schemas.microsoft.com/office/drawing/2010/main" val="0"/>
-              </a:ext>
-            </a:extLst>
-          </a:blip>
-          <a:srcRect/>
-          <a:stretch>
-            <a:fillRect/>
-          </a:stretch>
-        </p:blipFill>
-        <p:spPr bwMode="auto">
-          <a:xfrm>
-            <a:off x="11157376" y="5790600"/>
-            <a:ext cx="1483425" cy="927112"/>
-          </a:xfrm>
-          <a:prstGeom prst="rect">
-            <a:avLst/>
-          </a:prstGeom>
-          <a:noFill/>
-          <a:ln>
-            <a:noFill/>
-          </a:ln>
-        </p:spPr>
-      </p:pic>
-      <p:pic>
-        <p:nvPicPr>
-          <p:cNvPr id="19" name="Imagem 18" descr="A cartoon hand with a red watch&#10;&#10;Description automatically generated">
-            <a:extLst>
-              <a:ext uri="{FF2B5EF4-FFF2-40B4-BE49-F238E27FC236}">
-                <a16:creationId xmlns:a16="http://schemas.microsoft.com/office/drawing/2014/main" id="{C6FEC71D-06BB-8877-0F74-D36498DA5D63}"/>
-              </a:ext>
-            </a:extLst>
-          </p:cNvPr>
-          <p:cNvPicPr>
-            <a:picLocks noChangeAspect="1"/>
-          </p:cNvPicPr>
-          <p:nvPr/>
-        </p:nvPicPr>
-        <p:blipFill>
-          <a:blip r:embed="rId9" cstate="print">
-            <a:extLst>
-              <a:ext uri="{28A0092B-C50C-407E-A947-70E740481C1C}">
-                <a14:useLocalDpi xmlns:a14="http://schemas.microsoft.com/office/drawing/2010/main" val="0"/>
-              </a:ext>
-            </a:extLst>
-          </a:blip>
-          <a:srcRect/>
-          <a:stretch>
-            <a:fillRect/>
-          </a:stretch>
-        </p:blipFill>
-        <p:spPr bwMode="auto">
-          <a:xfrm>
-            <a:off x="9242469" y="5790601"/>
-            <a:ext cx="1483425" cy="927111"/>
-          </a:xfrm>
-          <a:prstGeom prst="rect">
-            <a:avLst/>
-          </a:prstGeom>
-          <a:noFill/>
-          <a:ln>
-            <a:noFill/>
-          </a:ln>
-        </p:spPr>
-      </p:pic>
-      <p:pic>
-        <p:nvPicPr>
-          <p:cNvPr id="20" name="Imagem 19" descr="A hand with a white square on it&#10;&#10;Description automatically generated">
-            <a:extLst>
-              <a:ext uri="{FF2B5EF4-FFF2-40B4-BE49-F238E27FC236}">
-                <a16:creationId xmlns:a16="http://schemas.microsoft.com/office/drawing/2014/main" id="{59E5F999-A65A-E195-355E-43239B098B6F}"/>
-              </a:ext>
-            </a:extLst>
-          </p:cNvPr>
-          <p:cNvPicPr>
-            <a:picLocks noChangeAspect="1"/>
-          </p:cNvPicPr>
-          <p:nvPr/>
-        </p:nvPicPr>
-        <p:blipFill>
-          <a:blip r:embed="rId10" cstate="print">
-            <a:extLst>
-              <a:ext uri="{28A0092B-C50C-407E-A947-70E740481C1C}">
-                <a14:useLocalDpi xmlns:a14="http://schemas.microsoft.com/office/drawing/2010/main" val="0"/>
-              </a:ext>
-            </a:extLst>
-          </a:blip>
-          <a:srcRect/>
-          <a:stretch>
-            <a:fillRect/>
-          </a:stretch>
-        </p:blipFill>
-        <p:spPr bwMode="auto">
-          <a:xfrm>
-            <a:off x="7326216" y="5790600"/>
-            <a:ext cx="1483426" cy="927112"/>
-          </a:xfrm>
-          <a:prstGeom prst="rect">
-            <a:avLst/>
-          </a:prstGeom>
-          <a:noFill/>
-          <a:ln>
-            <a:noFill/>
-          </a:ln>
-        </p:spPr>
-      </p:pic>
-      <p:graphicFrame>
-        <p:nvGraphicFramePr>
-          <p:cNvPr id="21" name="Marcador de Posição de Conteúdo 9">
-            <a:extLst>
-              <a:ext uri="{FF2B5EF4-FFF2-40B4-BE49-F238E27FC236}">
-                <a16:creationId xmlns:a16="http://schemas.microsoft.com/office/drawing/2014/main" id="{0B677C5F-8E4D-98A1-5CE6-594C37EDF81B}"/>
-              </a:ext>
-            </a:extLst>
-          </p:cNvPr>
-          <p:cNvGraphicFramePr>
-            <a:graphicFrameLocks/>
-          </p:cNvGraphicFramePr>
-          <p:nvPr>
-            <p:extLst>
-              <p:ext uri="{D42A27DB-BD31-4B8C-83A1-F6EECF244321}">
-                <p14:modId xmlns:p14="http://schemas.microsoft.com/office/powerpoint/2010/main" val="1252060636"/>
-              </p:ext>
-            </p:extLst>
-          </p:nvPr>
-        </p:nvGraphicFramePr>
-        <p:xfrm>
-          <a:off x="7328092" y="6806804"/>
-          <a:ext cx="5317932" cy="1222744"/>
-        </p:xfrm>
-        <a:graphic>
-          <a:graphicData uri="http://schemas.openxmlformats.org/drawingml/2006/table">
-            <a:tbl>
-              <a:tblPr firstRow="1" bandRow="1">
-                <a:tableStyleId>{5C22544A-7EE6-4342-B048-85BDC9FD1C3A}</a:tableStyleId>
-              </a:tblPr>
-              <a:tblGrid>
-                <a:gridCol w="5317932">
-                  <a:extLst>
-                    <a:ext uri="{9D8B030D-6E8A-4147-A177-3AD203B41FA5}">
-                      <a16:colId xmlns:a16="http://schemas.microsoft.com/office/drawing/2014/main" val="1827561464"/>
-                    </a:ext>
-                  </a:extLst>
-                </a:gridCol>
-              </a:tblGrid>
-              <a:tr h="331736">
-                <a:tc>
-                  <a:txBody>
-                    <a:bodyPr/>
-                    <a:lstStyle/>
-                    <a:p>
-                      <a:pPr algn="ctr"/>
-                      <a:r>
-                        <a:rPr lang="pt-PT" dirty="0">
-                          <a:solidFill>
-                            <a:schemeClr val="bg1"/>
-                          </a:solidFill>
-                        </a:rPr>
-                        <a:t>Recompensar o jogador</a:t>
-                      </a:r>
-                    </a:p>
-                  </a:txBody>
-                  <a:tcPr>
-                    <a:solidFill>
-                      <a:srgbClr val="165A69"/>
-                    </a:solidFill>
-                  </a:tcPr>
-                </a:tc>
-                <a:extLst>
-                  <a:ext uri="{0D108BD9-81ED-4DB2-BD59-A6C34878D82A}">
-                    <a16:rowId xmlns:a16="http://schemas.microsoft.com/office/drawing/2014/main" val="2317877568"/>
-                  </a:ext>
-                </a:extLst>
-              </a:tr>
-              <a:tr h="856984">
-                <a:tc>
-                  <a:txBody>
-                    <a:bodyPr/>
-                    <a:lstStyle/>
-                    <a:p>
-                      <a:pPr marL="0" indent="0">
-                        <a:buFont typeface="Arial" panose="020B0604020202020204" pitchFamily="34" charset="0"/>
-                        <a:buNone/>
-                      </a:pPr>
-                      <a:r>
-                        <a:rPr lang="pt-PT" sz="800" kern="1200" dirty="0">
-                          <a:solidFill>
-                            <a:schemeClr val="dk1"/>
-                          </a:solidFill>
-                          <a:effectLst/>
-                          <a:latin typeface="+mn-lt"/>
-                          <a:ea typeface="+mn-ea"/>
-                          <a:cs typeface="+mn-cs"/>
-                        </a:rPr>
-                        <a:t>Ao completar cada minijogo, o jogador é levado para um novo desafio, onde deverá procurar um dos ovos do seu companheiro, o pássaro Alfredo, perdido num dos arbustos. Esta etapa foi desenvolvida para proporcionar uma sensação de progresso no jogo. Ao entrar na cena, Alfredo faz uma breve explicação, informando ao jogador que um dos seus ovos está perdido naquela área e pede que ele procure atrás dos arbustos. Esses arbustos aparecerão no espaço ao redor do jogador, e ele precisará usar a câmara do dispositivo para os procurar e carregar neles até encontrar o arbusto que contem o ovo.</a:t>
                       </a:r>
                     </a:p>
                   </a:txBody>
@@ -4920,287 +4503,21 @@
           <p:nvPr/>
         </p:nvPicPr>
         <p:blipFill>
-          <a:blip r:embed="rId11"/>
+          <a:blip r:embed="rId6"/>
           <a:stretch>
             <a:fillRect/>
           </a:stretch>
         </p:blipFill>
         <p:spPr>
           <a:xfrm>
-            <a:off x="7328092" y="8113856"/>
-            <a:ext cx="2002942" cy="1010659"/>
+            <a:off x="10418579" y="6358167"/>
+            <a:ext cx="2223521" cy="1032469"/>
           </a:xfrm>
           <a:prstGeom prst="rect">
             <a:avLst/>
           </a:prstGeom>
         </p:spPr>
       </p:pic>
-      <p:pic>
-        <p:nvPicPr>
-          <p:cNvPr id="27" name="Imagem 26" descr="A group of white paper squares on a white surface&#10;&#10;Description automatically generated">
-            <a:extLst>
-              <a:ext uri="{FF2B5EF4-FFF2-40B4-BE49-F238E27FC236}">
-                <a16:creationId xmlns:a16="http://schemas.microsoft.com/office/drawing/2014/main" id="{2C64A050-0047-C5FD-B9E3-4A6C0309B3DE}"/>
-              </a:ext>
-            </a:extLst>
-          </p:cNvPr>
-          <p:cNvPicPr>
-            <a:picLocks noChangeAspect="1"/>
-          </p:cNvPicPr>
-          <p:nvPr/>
-        </p:nvPicPr>
-        <p:blipFill>
-          <a:blip r:embed="rId12" cstate="print">
-            <a:extLst>
-              <a:ext uri="{28A0092B-C50C-407E-A947-70E740481C1C}">
-                <a14:useLocalDpi xmlns:a14="http://schemas.microsoft.com/office/drawing/2010/main" val="0"/>
-              </a:ext>
-            </a:extLst>
-          </a:blip>
-          <a:srcRect/>
-          <a:stretch>
-            <a:fillRect/>
-          </a:stretch>
-        </p:blipFill>
-        <p:spPr bwMode="auto">
-          <a:xfrm>
-            <a:off x="9767289" y="3049761"/>
-            <a:ext cx="1413663" cy="883625"/>
-          </a:xfrm>
-          <a:prstGeom prst="rect">
-            <a:avLst/>
-          </a:prstGeom>
-          <a:noFill/>
-          <a:ln>
-            <a:noFill/>
-          </a:ln>
-        </p:spPr>
-      </p:pic>
-      <p:pic>
-        <p:nvPicPr>
-          <p:cNvPr id="28" name="Imagem 27" descr="A room with tables and chairs and a cartoon of trees&#10;&#10;Description automatically generated">
-            <a:extLst>
-              <a:ext uri="{FF2B5EF4-FFF2-40B4-BE49-F238E27FC236}">
-                <a16:creationId xmlns:a16="http://schemas.microsoft.com/office/drawing/2014/main" id="{3A62ADF7-5C69-2AD7-92C1-DEA417C624B4}"/>
-              </a:ext>
-            </a:extLst>
-          </p:cNvPr>
-          <p:cNvPicPr>
-            <a:picLocks noChangeAspect="1"/>
-          </p:cNvPicPr>
-          <p:nvPr/>
-        </p:nvPicPr>
-        <p:blipFill>
-          <a:blip r:embed="rId13" cstate="print">
-            <a:extLst>
-              <a:ext uri="{28A0092B-C50C-407E-A947-70E740481C1C}">
-                <a14:useLocalDpi xmlns:a14="http://schemas.microsoft.com/office/drawing/2010/main" val="0"/>
-              </a:ext>
-            </a:extLst>
-          </a:blip>
-          <a:srcRect/>
-          <a:stretch>
-            <a:fillRect/>
-          </a:stretch>
-        </p:blipFill>
-        <p:spPr bwMode="auto">
-          <a:xfrm>
-            <a:off x="9366273" y="8109756"/>
-            <a:ext cx="1623665" cy="1014759"/>
-          </a:xfrm>
-          <a:prstGeom prst="rect">
-            <a:avLst/>
-          </a:prstGeom>
-          <a:noFill/>
-          <a:ln>
-            <a:noFill/>
-          </a:ln>
-        </p:spPr>
-      </p:pic>
-      <p:pic>
-        <p:nvPicPr>
-          <p:cNvPr id="30" name="Imagem 29" descr="A room with tables and chairs and a cartoon egg&#10;&#10;Description automatically generated">
-            <a:extLst>
-              <a:ext uri="{FF2B5EF4-FFF2-40B4-BE49-F238E27FC236}">
-                <a16:creationId xmlns:a16="http://schemas.microsoft.com/office/drawing/2014/main" id="{0461A102-C715-0A67-DBC0-6CB156D1D569}"/>
-              </a:ext>
-            </a:extLst>
-          </p:cNvPr>
-          <p:cNvPicPr>
-            <a:picLocks noChangeAspect="1"/>
-          </p:cNvPicPr>
-          <p:nvPr/>
-        </p:nvPicPr>
-        <p:blipFill>
-          <a:blip r:embed="rId14" cstate="print">
-            <a:extLst>
-              <a:ext uri="{28A0092B-C50C-407E-A947-70E740481C1C}">
-                <a14:useLocalDpi xmlns:a14="http://schemas.microsoft.com/office/drawing/2010/main" val="0"/>
-              </a:ext>
-            </a:extLst>
-          </a:blip>
-          <a:srcRect/>
-          <a:stretch>
-            <a:fillRect/>
-          </a:stretch>
-        </p:blipFill>
-        <p:spPr bwMode="auto">
-          <a:xfrm>
-            <a:off x="11047447" y="8109756"/>
-            <a:ext cx="1623666" cy="1014759"/>
-          </a:xfrm>
-          <a:prstGeom prst="rect">
-            <a:avLst/>
-          </a:prstGeom>
-          <a:noFill/>
-          <a:ln>
-            <a:noFill/>
-          </a:ln>
-        </p:spPr>
-      </p:pic>
-      <p:graphicFrame>
-        <p:nvGraphicFramePr>
-          <p:cNvPr id="31" name="Marcador de Posição de Conteúdo 9">
-            <a:extLst>
-              <a:ext uri="{FF2B5EF4-FFF2-40B4-BE49-F238E27FC236}">
-                <a16:creationId xmlns:a16="http://schemas.microsoft.com/office/drawing/2014/main" id="{49C7C712-5818-2A5F-D6A6-627FD33D55FD}"/>
-              </a:ext>
-            </a:extLst>
-          </p:cNvPr>
-          <p:cNvGraphicFramePr>
-            <a:graphicFrameLocks/>
-          </p:cNvGraphicFramePr>
-          <p:nvPr>
-            <p:extLst>
-              <p:ext uri="{D42A27DB-BD31-4B8C-83A1-F6EECF244321}">
-                <p14:modId xmlns:p14="http://schemas.microsoft.com/office/powerpoint/2010/main" val="2364989595"/>
-              </p:ext>
-            </p:extLst>
-          </p:nvPr>
-        </p:nvGraphicFramePr>
-        <p:xfrm>
-          <a:off x="4560248" y="4990404"/>
-          <a:ext cx="2626387" cy="2557972"/>
-        </p:xfrm>
-        <a:graphic>
-          <a:graphicData uri="http://schemas.openxmlformats.org/drawingml/2006/table">
-            <a:tbl>
-              <a:tblPr firstRow="1" bandRow="1">
-                <a:tableStyleId>{5C22544A-7EE6-4342-B048-85BDC9FD1C3A}</a:tableStyleId>
-              </a:tblPr>
-              <a:tblGrid>
-                <a:gridCol w="2626387">
-                  <a:extLst>
-                    <a:ext uri="{9D8B030D-6E8A-4147-A177-3AD203B41FA5}">
-                      <a16:colId xmlns:a16="http://schemas.microsoft.com/office/drawing/2014/main" val="1827561464"/>
-                    </a:ext>
-                  </a:extLst>
-                </a:gridCol>
-              </a:tblGrid>
-              <a:tr h="393892">
-                <a:tc>
-                  <a:txBody>
-                    <a:bodyPr/>
-                    <a:lstStyle/>
-                    <a:p>
-                      <a:pPr algn="ctr"/>
-                      <a:r>
-                        <a:rPr lang="pt-PT" dirty="0"/>
-                        <a:t>Narrativa</a:t>
-                      </a:r>
-                    </a:p>
-                  </a:txBody>
-                  <a:tcPr>
-                    <a:solidFill>
-                      <a:srgbClr val="165A69"/>
-                    </a:solidFill>
-                  </a:tcPr>
-                </a:tc>
-                <a:extLst>
-                  <a:ext uri="{0D108BD9-81ED-4DB2-BD59-A6C34878D82A}">
-                    <a16:rowId xmlns:a16="http://schemas.microsoft.com/office/drawing/2014/main" val="2317877568"/>
-                  </a:ext>
-                </a:extLst>
-              </a:tr>
-              <a:tr h="1784828">
-                <a:tc>
-                  <a:txBody>
-                    <a:bodyPr/>
-                    <a:lstStyle/>
-                    <a:p>
-                      <a:pPr marL="0" indent="0">
-                        <a:buFont typeface="Arial" panose="020B0604020202020204" pitchFamily="34" charset="0"/>
-                        <a:buNone/>
-                      </a:pPr>
-                      <a:r>
-                        <a:rPr lang="pt-PT" sz="800" dirty="0"/>
-                        <a:t>O enredo do jogo desenrola-se em torno da cativante história de Alfredo, um pássaro cujos ovos foram perdidos após uma tempestade, que levou o seu ninho. O jogador é imerso numa jornada emocionante em que ajuda Alfredo a recuperar os seus preciosos ovos. Ao longo desta aventura, o jogador depara-se com novas personagens, a borboleta Aurora, o coala Kiko e a abelha Mel. As personagens foram escolhidas minuciosamente, representando cada uma delas, a sensação que o procedimento específico, que lhes corresponde, provocará à criança. Mais, cada personagem, para além de acompanhar Alfredo e o jogador na busca pelos ovos, desempenha um papel crucial, ao ensinar e esclarecer os jogadores, de maneira lúdica e envolvente, quanto aos procedimentos médicos que o jogador enfrentará após completar o jogo.</a:t>
-                      </a:r>
-                    </a:p>
-                  </a:txBody>
-                  <a:tcPr/>
-                </a:tc>
-                <a:extLst>
-                  <a:ext uri="{0D108BD9-81ED-4DB2-BD59-A6C34878D82A}">
-                    <a16:rowId xmlns:a16="http://schemas.microsoft.com/office/drawing/2014/main" val="1410093574"/>
-                  </a:ext>
-                </a:extLst>
-              </a:tr>
-            </a:tbl>
-          </a:graphicData>
-        </a:graphic>
-      </p:graphicFrame>
-      <p:sp>
-        <p:nvSpPr>
-          <p:cNvPr id="6" name="CaixaDeTexto 5">
-            <a:extLst>
-              <a:ext uri="{FF2B5EF4-FFF2-40B4-BE49-F238E27FC236}">
-                <a16:creationId xmlns:a16="http://schemas.microsoft.com/office/drawing/2014/main" id="{62222E8F-7AAB-4674-2C9D-46A046EDA0F2}"/>
-              </a:ext>
-            </a:extLst>
-          </p:cNvPr>
-          <p:cNvSpPr txBox="1"/>
-          <p:nvPr/>
-        </p:nvSpPr>
-        <p:spPr>
-          <a:xfrm>
-            <a:off x="337849" y="8040260"/>
-            <a:ext cx="2023311" cy="677108"/>
-          </a:xfrm>
-          <a:prstGeom prst="rect">
-            <a:avLst/>
-          </a:prstGeom>
-          <a:noFill/>
-        </p:spPr>
-        <p:txBody>
-          <a:bodyPr wrap="none" rtlCol="0">
-            <a:spAutoFit/>
-          </a:bodyPr>
-          <a:lstStyle/>
-          <a:p>
-            <a:r>
-              <a:rPr lang="pt-PT" sz="1400" b="1" dirty="0">
-                <a:solidFill>
-                  <a:srgbClr val="165A69"/>
-                </a:solidFill>
-              </a:rPr>
-              <a:t>Autores:</a:t>
-            </a:r>
-          </a:p>
-          <a:p>
-            <a:r>
-              <a:rPr lang="pt-PT" sz="1200" dirty="0"/>
-              <a:t>Ricardo Silvério – 2192283</a:t>
-            </a:r>
-          </a:p>
-          <a:p>
-            <a:r>
-              <a:rPr lang="pt-PT" sz="1200" dirty="0"/>
-              <a:t>Ricardo Pereira - 2202165</a:t>
-            </a:r>
-          </a:p>
-        </p:txBody>
-      </p:sp>
       <p:sp>
         <p:nvSpPr>
           <p:cNvPr id="7" name="CaixaDeTexto 6">
@@ -5215,8 +4532,8 @@
         </p:nvSpPr>
         <p:spPr>
           <a:xfrm>
-            <a:off x="2755561" y="8015545"/>
-            <a:ext cx="1760418" cy="1046440"/>
+            <a:off x="203200" y="8017237"/>
+            <a:ext cx="2452466" cy="1046440"/>
           </a:xfrm>
           <a:prstGeom prst="rect">
             <a:avLst/>
@@ -5241,25 +4558,25 @@
           <a:p>
             <a:r>
               <a:rPr lang="pt-PT" sz="1200" dirty="0"/>
-              <a:t>Roberto Ribeiro</a:t>
+              <a:t>Professor Roberto Ribeiro</a:t>
             </a:r>
           </a:p>
           <a:p>
             <a:r>
               <a:rPr lang="pt-PT" sz="1200" dirty="0"/>
-              <a:t>Anabela Marto</a:t>
+              <a:t>Professora  Anabela Marto</a:t>
             </a:r>
           </a:p>
           <a:p>
             <a:r>
               <a:rPr lang="pt-PT" sz="1200" dirty="0"/>
-              <a:t>Alexandrino Gonçalves</a:t>
+              <a:t>Professor Alexandrino Gonçalves</a:t>
             </a:r>
           </a:p>
           <a:p>
             <a:r>
               <a:rPr lang="pt-PT" sz="1200" dirty="0"/>
-              <a:t>Nuno Rodrigues</a:t>
+              <a:t>Professor Nuno Rodrigues</a:t>
             </a:r>
           </a:p>
         </p:txBody>
@@ -5278,8 +4595,8 @@
         </p:nvCxnSpPr>
         <p:spPr bwMode="auto">
           <a:xfrm>
-            <a:off x="2656384" y="7963387"/>
-            <a:ext cx="0" cy="1150756"/>
+            <a:off x="175052" y="8087711"/>
+            <a:ext cx="0" cy="952029"/>
           </a:xfrm>
           <a:prstGeom prst="line">
             <a:avLst/>
@@ -5325,14 +4642,14 @@
           <p:nvPr>
             <p:extLst>
               <p:ext uri="{D42A27DB-BD31-4B8C-83A1-F6EECF244321}">
-                <p14:modId xmlns:p14="http://schemas.microsoft.com/office/powerpoint/2010/main" val="2262599206"/>
+                <p14:modId xmlns:p14="http://schemas.microsoft.com/office/powerpoint/2010/main" val="2550598783"/>
               </p:ext>
             </p:extLst>
           </p:nvPr>
         </p:nvGraphicFramePr>
         <p:xfrm>
-          <a:off x="4554244" y="7612630"/>
-          <a:ext cx="2635084" cy="1445697"/>
+          <a:off x="8192053" y="7503239"/>
+          <a:ext cx="4450047" cy="1501726"/>
         </p:xfrm>
         <a:graphic>
           <a:graphicData uri="http://schemas.openxmlformats.org/drawingml/2006/table">
@@ -5341,7 +4658,7 @@
                 <a:tableStyleId>{5C22544A-7EE6-4342-B048-85BDC9FD1C3A}</a:tableStyleId>
               </a:tblPr>
               <a:tblGrid>
-                <a:gridCol w="2635084">
+                <a:gridCol w="4450047">
                   <a:extLst>
                     <a:ext uri="{9D8B030D-6E8A-4147-A177-3AD203B41FA5}">
                       <a16:colId xmlns:a16="http://schemas.microsoft.com/office/drawing/2014/main" val="1827561464"/>
@@ -5349,7 +4666,7 @@
                   </a:extLst>
                 </a:gridCol>
               </a:tblGrid>
-              <a:tr h="332288">
+              <a:tr h="385570">
                 <a:tc>
                   <a:txBody>
                     <a:bodyPr/>
@@ -5362,7 +4679,7 @@
                             <a:schemeClr val="bg1"/>
                           </a:solidFill>
                         </a:rPr>
-                        <a:t>Testes e Conclusões</a:t>
+                        <a:t>Testes e Conclusões </a:t>
                       </a:r>
                     </a:p>
                   </a:txBody>
@@ -5378,18 +4695,18 @@
                   </a:ext>
                 </a:extLst>
               </a:tr>
-              <a:tr h="1079937">
+              <a:tr h="1116156">
                 <a:tc>
                   <a:txBody>
                     <a:bodyPr/>
                     <a:lstStyle/>
                     <a:p>
-                      <a:pPr marL="0" indent="0">
+                      <a:pPr marL="0" indent="0" algn="just">
                         <a:buFont typeface="Arial" panose="020B0604020202020204" pitchFamily="34" charset="0"/>
                         <a:buNone/>
                       </a:pPr>
                       <a:r>
-                        <a:rPr lang="pt-PT" sz="800" kern="1200" dirty="0">
+                        <a:rPr lang="pt-PT" sz="1200" kern="1200" dirty="0">
                           <a:solidFill>
                             <a:schemeClr val="dk1"/>
                           </a:solidFill>
@@ -5398,10 +4715,10 @@
                           <a:ea typeface="+mn-ea"/>
                           <a:cs typeface="+mn-cs"/>
                         </a:rPr>
-                        <a:t>Foram desenvolvidos dois questionários, o questionário demográfico para obter dados do fórum pessoal dos participantes, e o questionário SUS para obter a opinião dos participantes acerca da usabilidade do jogo, ambos com recurso à plataforma Google </a:t>
+                        <a:t>Foram realizados testes a 10 voluntários, utilizando um questionário demográfico e o questionário </a:t>
                       </a:r>
                       <a:r>
-                        <a:rPr lang="pt-PT" sz="800" kern="1200" dirty="0" err="1">
+                        <a:rPr lang="pt-PT" sz="1200" i="1" kern="1200" dirty="0" err="1">
                           <a:solidFill>
                             <a:schemeClr val="dk1"/>
                           </a:solidFill>
@@ -5410,10 +4727,10 @@
                           <a:ea typeface="+mn-ea"/>
                           <a:cs typeface="+mn-cs"/>
                         </a:rPr>
-                        <a:t>Forms</a:t>
+                        <a:t>System</a:t>
                       </a:r>
                       <a:r>
-                        <a:rPr lang="pt-PT" sz="800" kern="1200" dirty="0">
+                        <a:rPr lang="pt-PT" sz="1200" i="1" kern="1200" dirty="0">
                           <a:solidFill>
                             <a:schemeClr val="dk1"/>
                           </a:solidFill>
@@ -5422,7 +4739,67 @@
                           <a:ea typeface="+mn-ea"/>
                           <a:cs typeface="+mn-cs"/>
                         </a:rPr>
-                        <a:t>. O questionário SUS obteve uma média de valores igual a 83, o que classifica a usabilidade como excelente.</a:t>
+                        <a:t> </a:t>
+                      </a:r>
+                      <a:r>
+                        <a:rPr lang="pt-PT" sz="1200" i="1" kern="1200" dirty="0" err="1">
+                          <a:solidFill>
+                            <a:schemeClr val="dk1"/>
+                          </a:solidFill>
+                          <a:effectLst/>
+                          <a:latin typeface="+mn-lt"/>
+                          <a:ea typeface="+mn-ea"/>
+                          <a:cs typeface="+mn-cs"/>
+                        </a:rPr>
+                        <a:t>Usability</a:t>
+                      </a:r>
+                      <a:r>
+                        <a:rPr lang="pt-PT" sz="1200" i="1" kern="1200" dirty="0">
+                          <a:solidFill>
+                            <a:schemeClr val="dk1"/>
+                          </a:solidFill>
+                          <a:effectLst/>
+                          <a:latin typeface="+mn-lt"/>
+                          <a:ea typeface="+mn-ea"/>
+                          <a:cs typeface="+mn-cs"/>
+                        </a:rPr>
+                        <a:t> </a:t>
+                      </a:r>
+                      <a:r>
+                        <a:rPr lang="pt-PT" sz="1200" i="1" kern="1200" dirty="0" err="1">
+                          <a:solidFill>
+                            <a:schemeClr val="dk1"/>
+                          </a:solidFill>
+                          <a:effectLst/>
+                          <a:latin typeface="+mn-lt"/>
+                          <a:ea typeface="+mn-ea"/>
+                          <a:cs typeface="+mn-cs"/>
+                        </a:rPr>
+                        <a:t>Scale</a:t>
+                      </a:r>
+                      <a:r>
+                        <a:rPr lang="pt-PT" sz="1200" i="1" kern="1200" dirty="0">
+                          <a:solidFill>
+                            <a:schemeClr val="dk1"/>
+                          </a:solidFill>
+                          <a:effectLst/>
+                          <a:latin typeface="+mn-lt"/>
+                          <a:ea typeface="+mn-ea"/>
+                          <a:cs typeface="+mn-cs"/>
+                        </a:rPr>
+                        <a:t> </a:t>
+                      </a:r>
+                      <a:r>
+                        <a:rPr lang="pt-PT" sz="1200" kern="1200" dirty="0">
+                          <a:solidFill>
+                            <a:schemeClr val="dk1"/>
+                          </a:solidFill>
+                          <a:effectLst/>
+                          <a:latin typeface="+mn-lt"/>
+                          <a:ea typeface="+mn-ea"/>
+                          <a:cs typeface="+mn-cs"/>
+                        </a:rPr>
+                        <a:t>(SUS), para obter uma avaliação sobre da usabilidade do jogo. A pontuação SUS obtida permite classificar a usabilidade da aplicação como excelente.</a:t>
                       </a:r>
                     </a:p>
                   </a:txBody>
@@ -5440,10 +4817,10 @@
       </p:graphicFrame>
       <p:sp>
         <p:nvSpPr>
-          <p:cNvPr id="24" name="Retângulo 21">
+          <p:cNvPr id="38" name="Retângulo 37">
             <a:extLst>
               <a:ext uri="{FF2B5EF4-FFF2-40B4-BE49-F238E27FC236}">
-                <a16:creationId xmlns:a16="http://schemas.microsoft.com/office/drawing/2014/main" id="{F6ED9F2D-D27A-8F84-B156-45B6B0A3B252}"/>
+                <a16:creationId xmlns:a16="http://schemas.microsoft.com/office/drawing/2014/main" id="{382CD395-0568-D694-F718-FA25EAAB0783}"/>
               </a:ext>
             </a:extLst>
           </p:cNvPr>
@@ -5452,8 +4829,1024 @@
         </p:nvSpPr>
         <p:spPr bwMode="auto">
           <a:xfrm>
-            <a:off x="7326216" y="4041853"/>
-            <a:ext cx="198061" cy="254691"/>
+            <a:off x="-4440" y="9240118"/>
+            <a:ext cx="12806040" cy="361082"/>
+          </a:xfrm>
+          <a:prstGeom prst="rect">
+            <a:avLst/>
+          </a:prstGeom>
+          <a:solidFill>
+            <a:srgbClr val="165A69"/>
+          </a:solidFill>
+          <a:ln w="9525" cap="flat" cmpd="sng" algn="ctr">
+            <a:noFill/>
+            <a:prstDash val="solid"/>
+            <a:round/>
+            <a:headEnd type="none" w="med" len="med"/>
+            <a:tailEnd type="none" w="med" len="med"/>
+          </a:ln>
+          <a:effectLst/>
+        </p:spPr>
+        <p:txBody>
+          <a:bodyPr vert="horz" wrap="square" lIns="91440" tIns="45720" rIns="91440" bIns="45720" numCol="1" rtlCol="0" anchor="t" anchorCtr="0" compatLnSpc="1">
+            <a:prstTxWarp prst="textNoShape">
+              <a:avLst/>
+            </a:prstTxWarp>
+          </a:bodyPr>
+          <a:lstStyle/>
+          <a:p>
+            <a:pPr marL="0" marR="0" indent="0" algn="l" defTabSz="1279525" rtl="0" eaLnBrk="1" fontAlgn="base" latinLnBrk="0" hangingPunct="1">
+              <a:lnSpc>
+                <a:spcPct val="100000"/>
+              </a:lnSpc>
+              <a:spcBef>
+                <a:spcPct val="0"/>
+              </a:spcBef>
+              <a:spcAft>
+                <a:spcPct val="0"/>
+              </a:spcAft>
+              <a:buClrTx/>
+              <a:buSzTx/>
+              <a:buFontTx/>
+              <a:buNone/>
+              <a:tabLst/>
+            </a:pPr>
+            <a:r>
+              <a:rPr lang="pt-PT" sz="1600" dirty="0">
+                <a:solidFill>
+                  <a:schemeClr val="bg1"/>
+                </a:solidFill>
+                <a:latin typeface="Arial" panose="020B0604020202020204" pitchFamily="34" charset="0"/>
+              </a:rPr>
+              <a:t>Licenciatura em Engenharia Informática – Projeto Informático					2023/2024</a:t>
+            </a:r>
+            <a:endParaRPr kumimoji="0" lang="pt-PT" sz="1600" b="0" i="0" u="none" strike="noStrike" cap="none" normalizeH="0" baseline="0" dirty="0">
+              <a:ln>
+                <a:noFill/>
+              </a:ln>
+              <a:solidFill>
+                <a:schemeClr val="bg1"/>
+              </a:solidFill>
+              <a:effectLst/>
+              <a:latin typeface="Arial" panose="020B0604020202020204" pitchFamily="34" charset="0"/>
+            </a:endParaRPr>
+          </a:p>
+        </p:txBody>
+      </p:sp>
+      <p:sp>
+        <p:nvSpPr>
+          <p:cNvPr id="14" name="Retângulo 13">
+            <a:extLst>
+              <a:ext uri="{FF2B5EF4-FFF2-40B4-BE49-F238E27FC236}">
+                <a16:creationId xmlns:a16="http://schemas.microsoft.com/office/drawing/2014/main" id="{7F648833-416C-15EE-F82C-5978B58EF0AA}"/>
+              </a:ext>
+            </a:extLst>
+          </p:cNvPr>
+          <p:cNvSpPr/>
+          <p:nvPr/>
+        </p:nvSpPr>
+        <p:spPr bwMode="auto">
+          <a:xfrm>
+            <a:off x="4192688" y="5939943"/>
+            <a:ext cx="3711794" cy="2993264"/>
+          </a:xfrm>
+          <a:custGeom>
+            <a:avLst/>
+            <a:gdLst>
+              <a:gd name="connsiteX0" fmla="*/ 0 w 3425103"/>
+              <a:gd name="connsiteY0" fmla="*/ 0 h 2772490"/>
+              <a:gd name="connsiteX1" fmla="*/ 3425103 w 3425103"/>
+              <a:gd name="connsiteY1" fmla="*/ 0 h 2772490"/>
+              <a:gd name="connsiteX2" fmla="*/ 3425103 w 3425103"/>
+              <a:gd name="connsiteY2" fmla="*/ 2772490 h 2772490"/>
+              <a:gd name="connsiteX3" fmla="*/ 0 w 3425103"/>
+              <a:gd name="connsiteY3" fmla="*/ 2772490 h 2772490"/>
+              <a:gd name="connsiteX4" fmla="*/ 0 w 3425103"/>
+              <a:gd name="connsiteY4" fmla="*/ 0 h 2772490"/>
+              <a:gd name="connsiteX0" fmla="*/ 0 w 3425103"/>
+              <a:gd name="connsiteY0" fmla="*/ 0 h 3513572"/>
+              <a:gd name="connsiteX1" fmla="*/ 3425103 w 3425103"/>
+              <a:gd name="connsiteY1" fmla="*/ 0 h 3513572"/>
+              <a:gd name="connsiteX2" fmla="*/ 3425103 w 3425103"/>
+              <a:gd name="connsiteY2" fmla="*/ 2772490 h 3513572"/>
+              <a:gd name="connsiteX3" fmla="*/ 0 w 3425103"/>
+              <a:gd name="connsiteY3" fmla="*/ 2772490 h 3513572"/>
+              <a:gd name="connsiteX4" fmla="*/ 0 w 3425103"/>
+              <a:gd name="connsiteY4" fmla="*/ 0 h 3513572"/>
+              <a:gd name="connsiteX0" fmla="*/ 0 w 3425103"/>
+              <a:gd name="connsiteY0" fmla="*/ 0 h 4043316"/>
+              <a:gd name="connsiteX1" fmla="*/ 3425103 w 3425103"/>
+              <a:gd name="connsiteY1" fmla="*/ 0 h 4043316"/>
+              <a:gd name="connsiteX2" fmla="*/ 3425103 w 3425103"/>
+              <a:gd name="connsiteY2" fmla="*/ 2772490 h 4043316"/>
+              <a:gd name="connsiteX3" fmla="*/ 0 w 3425103"/>
+              <a:gd name="connsiteY3" fmla="*/ 2772490 h 4043316"/>
+              <a:gd name="connsiteX4" fmla="*/ 0 w 3425103"/>
+              <a:gd name="connsiteY4" fmla="*/ 0 h 4043316"/>
+              <a:gd name="connsiteX0" fmla="*/ 0 w 3425103"/>
+              <a:gd name="connsiteY0" fmla="*/ 0 h 4043316"/>
+              <a:gd name="connsiteX1" fmla="*/ 3425103 w 3425103"/>
+              <a:gd name="connsiteY1" fmla="*/ 0 h 4043316"/>
+              <a:gd name="connsiteX2" fmla="*/ 3425103 w 3425103"/>
+              <a:gd name="connsiteY2" fmla="*/ 2772490 h 4043316"/>
+              <a:gd name="connsiteX3" fmla="*/ 0 w 3425103"/>
+              <a:gd name="connsiteY3" fmla="*/ 2772490 h 4043316"/>
+              <a:gd name="connsiteX4" fmla="*/ 0 w 3425103"/>
+              <a:gd name="connsiteY4" fmla="*/ 0 h 4043316"/>
+              <a:gd name="connsiteX0" fmla="*/ 0 w 3425103"/>
+              <a:gd name="connsiteY0" fmla="*/ 0 h 4043316"/>
+              <a:gd name="connsiteX1" fmla="*/ 3425103 w 3425103"/>
+              <a:gd name="connsiteY1" fmla="*/ 0 h 4043316"/>
+              <a:gd name="connsiteX2" fmla="*/ 3425103 w 3425103"/>
+              <a:gd name="connsiteY2" fmla="*/ 2772490 h 4043316"/>
+              <a:gd name="connsiteX3" fmla="*/ 0 w 3425103"/>
+              <a:gd name="connsiteY3" fmla="*/ 2772490 h 4043316"/>
+              <a:gd name="connsiteX4" fmla="*/ 0 w 3425103"/>
+              <a:gd name="connsiteY4" fmla="*/ 0 h 4043316"/>
+              <a:gd name="connsiteX0" fmla="*/ 0 w 3425103"/>
+              <a:gd name="connsiteY0" fmla="*/ 0 h 3966305"/>
+              <a:gd name="connsiteX1" fmla="*/ 3425103 w 3425103"/>
+              <a:gd name="connsiteY1" fmla="*/ 0 h 3966305"/>
+              <a:gd name="connsiteX2" fmla="*/ 3425103 w 3425103"/>
+              <a:gd name="connsiteY2" fmla="*/ 2772490 h 3966305"/>
+              <a:gd name="connsiteX3" fmla="*/ 0 w 3425103"/>
+              <a:gd name="connsiteY3" fmla="*/ 2772490 h 3966305"/>
+              <a:gd name="connsiteX4" fmla="*/ 0 w 3425103"/>
+              <a:gd name="connsiteY4" fmla="*/ 0 h 3966305"/>
+              <a:gd name="connsiteX0" fmla="*/ 0 w 3425103"/>
+              <a:gd name="connsiteY0" fmla="*/ 0 h 3915726"/>
+              <a:gd name="connsiteX1" fmla="*/ 3425103 w 3425103"/>
+              <a:gd name="connsiteY1" fmla="*/ 0 h 3915726"/>
+              <a:gd name="connsiteX2" fmla="*/ 3425103 w 3425103"/>
+              <a:gd name="connsiteY2" fmla="*/ 2772490 h 3915726"/>
+              <a:gd name="connsiteX3" fmla="*/ 0 w 3425103"/>
+              <a:gd name="connsiteY3" fmla="*/ 2772490 h 3915726"/>
+              <a:gd name="connsiteX4" fmla="*/ 0 w 3425103"/>
+              <a:gd name="connsiteY4" fmla="*/ 0 h 3915726"/>
+            </a:gdLst>
+            <a:ahLst/>
+            <a:cxnLst>
+              <a:cxn ang="0">
+                <a:pos x="connsiteX0" y="connsiteY0"/>
+              </a:cxn>
+              <a:cxn ang="0">
+                <a:pos x="connsiteX1" y="connsiteY1"/>
+              </a:cxn>
+              <a:cxn ang="0">
+                <a:pos x="connsiteX2" y="connsiteY2"/>
+              </a:cxn>
+              <a:cxn ang="0">
+                <a:pos x="connsiteX3" y="connsiteY3"/>
+              </a:cxn>
+              <a:cxn ang="0">
+                <a:pos x="connsiteX4" y="connsiteY4"/>
+              </a:cxn>
+            </a:cxnLst>
+            <a:rect l="l" t="t" r="r" b="b"/>
+            <a:pathLst>
+              <a:path w="3425103" h="3915726">
+                <a:moveTo>
+                  <a:pt x="0" y="0"/>
+                </a:moveTo>
+                <a:cubicBezTo>
+                  <a:pt x="1787160" y="1264023"/>
+                  <a:pt x="1812755" y="1102658"/>
+                  <a:pt x="3425103" y="0"/>
+                </a:cubicBezTo>
+                <a:lnTo>
+                  <a:pt x="3425103" y="2772490"/>
+                </a:lnTo>
+                <a:cubicBezTo>
+                  <a:pt x="2841230" y="4306858"/>
+                  <a:pt x="637636" y="4286720"/>
+                  <a:pt x="0" y="2772490"/>
+                </a:cubicBezTo>
+                <a:lnTo>
+                  <a:pt x="0" y="0"/>
+                </a:lnTo>
+                <a:close/>
+              </a:path>
+            </a:pathLst>
+          </a:custGeom>
+          <a:solidFill>
+            <a:srgbClr val="A6D3D6"/>
+          </a:solidFill>
+          <a:ln w="9525" cap="flat" cmpd="sng" algn="ctr">
+            <a:noFill/>
+            <a:prstDash val="solid"/>
+            <a:round/>
+            <a:headEnd type="none" w="med" len="med"/>
+            <a:tailEnd type="none" w="med" len="med"/>
+          </a:ln>
+          <a:effectLst/>
+        </p:spPr>
+        <p:txBody>
+          <a:bodyPr vert="horz" wrap="square" lIns="91440" tIns="45720" rIns="91440" bIns="45720" numCol="1" rtlCol="0" anchor="t" anchorCtr="0" compatLnSpc="1">
+            <a:prstTxWarp prst="textNoShape">
+              <a:avLst/>
+            </a:prstTxWarp>
+          </a:bodyPr>
+          <a:lstStyle/>
+          <a:p>
+            <a:pPr marL="0" marR="0" indent="0" algn="l" defTabSz="1279525" rtl="0" eaLnBrk="1" fontAlgn="base" latinLnBrk="0" hangingPunct="1">
+              <a:lnSpc>
+                <a:spcPct val="100000"/>
+              </a:lnSpc>
+              <a:spcBef>
+                <a:spcPct val="0"/>
+              </a:spcBef>
+              <a:spcAft>
+                <a:spcPct val="0"/>
+              </a:spcAft>
+              <a:buClrTx/>
+              <a:buSzTx/>
+              <a:buFontTx/>
+              <a:buNone/>
+              <a:tabLst/>
+            </a:pPr>
+            <a:endParaRPr kumimoji="0" lang="pt-PT" sz="2500" b="0" i="0" u="none" strike="noStrike" cap="none" normalizeH="0" baseline="0" dirty="0">
+              <a:ln>
+                <a:noFill/>
+              </a:ln>
+              <a:solidFill>
+                <a:schemeClr val="tx1"/>
+              </a:solidFill>
+              <a:effectLst/>
+              <a:latin typeface="Arial" panose="020B0604020202020204" pitchFamily="34" charset="0"/>
+            </a:endParaRPr>
+          </a:p>
+        </p:txBody>
+      </p:sp>
+      <p:sp>
+        <p:nvSpPr>
+          <p:cNvPr id="26" name="Retângulo 13">
+            <a:extLst>
+              <a:ext uri="{FF2B5EF4-FFF2-40B4-BE49-F238E27FC236}">
+                <a16:creationId xmlns:a16="http://schemas.microsoft.com/office/drawing/2014/main" id="{295AD145-1D9A-584D-93EE-ACF298FF7697}"/>
+              </a:ext>
+            </a:extLst>
+          </p:cNvPr>
+          <p:cNvSpPr/>
+          <p:nvPr/>
+        </p:nvSpPr>
+        <p:spPr bwMode="auto">
+          <a:xfrm>
+            <a:off x="4196214" y="4014762"/>
+            <a:ext cx="3711794" cy="2774850"/>
+          </a:xfrm>
+          <a:custGeom>
+            <a:avLst/>
+            <a:gdLst>
+              <a:gd name="connsiteX0" fmla="*/ 0 w 3425103"/>
+              <a:gd name="connsiteY0" fmla="*/ 0 h 2772490"/>
+              <a:gd name="connsiteX1" fmla="*/ 3425103 w 3425103"/>
+              <a:gd name="connsiteY1" fmla="*/ 0 h 2772490"/>
+              <a:gd name="connsiteX2" fmla="*/ 3425103 w 3425103"/>
+              <a:gd name="connsiteY2" fmla="*/ 2772490 h 2772490"/>
+              <a:gd name="connsiteX3" fmla="*/ 0 w 3425103"/>
+              <a:gd name="connsiteY3" fmla="*/ 2772490 h 2772490"/>
+              <a:gd name="connsiteX4" fmla="*/ 0 w 3425103"/>
+              <a:gd name="connsiteY4" fmla="*/ 0 h 2772490"/>
+              <a:gd name="connsiteX0" fmla="*/ 0 w 3425103"/>
+              <a:gd name="connsiteY0" fmla="*/ 0 h 3513572"/>
+              <a:gd name="connsiteX1" fmla="*/ 3425103 w 3425103"/>
+              <a:gd name="connsiteY1" fmla="*/ 0 h 3513572"/>
+              <a:gd name="connsiteX2" fmla="*/ 3425103 w 3425103"/>
+              <a:gd name="connsiteY2" fmla="*/ 2772490 h 3513572"/>
+              <a:gd name="connsiteX3" fmla="*/ 0 w 3425103"/>
+              <a:gd name="connsiteY3" fmla="*/ 2772490 h 3513572"/>
+              <a:gd name="connsiteX4" fmla="*/ 0 w 3425103"/>
+              <a:gd name="connsiteY4" fmla="*/ 0 h 3513572"/>
+              <a:gd name="connsiteX0" fmla="*/ 0 w 3425103"/>
+              <a:gd name="connsiteY0" fmla="*/ 0 h 4043316"/>
+              <a:gd name="connsiteX1" fmla="*/ 3425103 w 3425103"/>
+              <a:gd name="connsiteY1" fmla="*/ 0 h 4043316"/>
+              <a:gd name="connsiteX2" fmla="*/ 3425103 w 3425103"/>
+              <a:gd name="connsiteY2" fmla="*/ 2772490 h 4043316"/>
+              <a:gd name="connsiteX3" fmla="*/ 0 w 3425103"/>
+              <a:gd name="connsiteY3" fmla="*/ 2772490 h 4043316"/>
+              <a:gd name="connsiteX4" fmla="*/ 0 w 3425103"/>
+              <a:gd name="connsiteY4" fmla="*/ 0 h 4043316"/>
+              <a:gd name="connsiteX0" fmla="*/ 0 w 3425103"/>
+              <a:gd name="connsiteY0" fmla="*/ 0 h 4043316"/>
+              <a:gd name="connsiteX1" fmla="*/ 3425103 w 3425103"/>
+              <a:gd name="connsiteY1" fmla="*/ 0 h 4043316"/>
+              <a:gd name="connsiteX2" fmla="*/ 3425103 w 3425103"/>
+              <a:gd name="connsiteY2" fmla="*/ 2772490 h 4043316"/>
+              <a:gd name="connsiteX3" fmla="*/ 0 w 3425103"/>
+              <a:gd name="connsiteY3" fmla="*/ 2772490 h 4043316"/>
+              <a:gd name="connsiteX4" fmla="*/ 0 w 3425103"/>
+              <a:gd name="connsiteY4" fmla="*/ 0 h 4043316"/>
+              <a:gd name="connsiteX0" fmla="*/ 0 w 3425103"/>
+              <a:gd name="connsiteY0" fmla="*/ 0 h 4043316"/>
+              <a:gd name="connsiteX1" fmla="*/ 3425103 w 3425103"/>
+              <a:gd name="connsiteY1" fmla="*/ 0 h 4043316"/>
+              <a:gd name="connsiteX2" fmla="*/ 3425103 w 3425103"/>
+              <a:gd name="connsiteY2" fmla="*/ 2772490 h 4043316"/>
+              <a:gd name="connsiteX3" fmla="*/ 0 w 3425103"/>
+              <a:gd name="connsiteY3" fmla="*/ 2772490 h 4043316"/>
+              <a:gd name="connsiteX4" fmla="*/ 0 w 3425103"/>
+              <a:gd name="connsiteY4" fmla="*/ 0 h 4043316"/>
+              <a:gd name="connsiteX0" fmla="*/ 0 w 3425103"/>
+              <a:gd name="connsiteY0" fmla="*/ 0 h 3985708"/>
+              <a:gd name="connsiteX1" fmla="*/ 3425103 w 3425103"/>
+              <a:gd name="connsiteY1" fmla="*/ 0 h 3985708"/>
+              <a:gd name="connsiteX2" fmla="*/ 3425103 w 3425103"/>
+              <a:gd name="connsiteY2" fmla="*/ 2772490 h 3985708"/>
+              <a:gd name="connsiteX3" fmla="*/ 0 w 3425103"/>
+              <a:gd name="connsiteY3" fmla="*/ 2772490 h 3985708"/>
+              <a:gd name="connsiteX4" fmla="*/ 0 w 3425103"/>
+              <a:gd name="connsiteY4" fmla="*/ 0 h 3985708"/>
+              <a:gd name="connsiteX0" fmla="*/ 0 w 3425103"/>
+              <a:gd name="connsiteY0" fmla="*/ 0 h 3922481"/>
+              <a:gd name="connsiteX1" fmla="*/ 3425103 w 3425103"/>
+              <a:gd name="connsiteY1" fmla="*/ 0 h 3922481"/>
+              <a:gd name="connsiteX2" fmla="*/ 3425103 w 3425103"/>
+              <a:gd name="connsiteY2" fmla="*/ 2772490 h 3922481"/>
+              <a:gd name="connsiteX3" fmla="*/ 0 w 3425103"/>
+              <a:gd name="connsiteY3" fmla="*/ 2772490 h 3922481"/>
+              <a:gd name="connsiteX4" fmla="*/ 0 w 3425103"/>
+              <a:gd name="connsiteY4" fmla="*/ 0 h 3922481"/>
+            </a:gdLst>
+            <a:ahLst/>
+            <a:cxnLst>
+              <a:cxn ang="0">
+                <a:pos x="connsiteX0" y="connsiteY0"/>
+              </a:cxn>
+              <a:cxn ang="0">
+                <a:pos x="connsiteX1" y="connsiteY1"/>
+              </a:cxn>
+              <a:cxn ang="0">
+                <a:pos x="connsiteX2" y="connsiteY2"/>
+              </a:cxn>
+              <a:cxn ang="0">
+                <a:pos x="connsiteX3" y="connsiteY3"/>
+              </a:cxn>
+              <a:cxn ang="0">
+                <a:pos x="connsiteX4" y="connsiteY4"/>
+              </a:cxn>
+            </a:cxnLst>
+            <a:rect l="l" t="t" r="r" b="b"/>
+            <a:pathLst>
+              <a:path w="3425103" h="3922481">
+                <a:moveTo>
+                  <a:pt x="0" y="0"/>
+                </a:moveTo>
+                <a:cubicBezTo>
+                  <a:pt x="1787160" y="1264023"/>
+                  <a:pt x="1812755" y="1102658"/>
+                  <a:pt x="3425103" y="0"/>
+                </a:cubicBezTo>
+                <a:lnTo>
+                  <a:pt x="3425103" y="2772490"/>
+                </a:lnTo>
+                <a:cubicBezTo>
+                  <a:pt x="2743889" y="4271724"/>
+                  <a:pt x="795814" y="4339528"/>
+                  <a:pt x="0" y="2772490"/>
+                </a:cubicBezTo>
+                <a:lnTo>
+                  <a:pt x="0" y="0"/>
+                </a:lnTo>
+                <a:close/>
+              </a:path>
+            </a:pathLst>
+          </a:custGeom>
+          <a:solidFill>
+            <a:srgbClr val="C3E1E3"/>
+          </a:solidFill>
+          <a:ln w="9525" cap="flat" cmpd="sng" algn="ctr">
+            <a:noFill/>
+            <a:prstDash val="solid"/>
+            <a:round/>
+            <a:headEnd type="none" w="med" len="med"/>
+            <a:tailEnd type="none" w="med" len="med"/>
+          </a:ln>
+          <a:effectLst/>
+        </p:spPr>
+        <p:txBody>
+          <a:bodyPr vert="horz" wrap="square" lIns="91440" tIns="45720" rIns="91440" bIns="45720" numCol="1" rtlCol="0" anchor="t" anchorCtr="0" compatLnSpc="1">
+            <a:prstTxWarp prst="textNoShape">
+              <a:avLst/>
+            </a:prstTxWarp>
+          </a:bodyPr>
+          <a:lstStyle/>
+          <a:p>
+            <a:pPr marL="0" marR="0" indent="0" algn="l" defTabSz="1279525" rtl="0" eaLnBrk="1" fontAlgn="base" latinLnBrk="0" hangingPunct="1">
+              <a:lnSpc>
+                <a:spcPct val="100000"/>
+              </a:lnSpc>
+              <a:spcBef>
+                <a:spcPct val="0"/>
+              </a:spcBef>
+              <a:spcAft>
+                <a:spcPct val="0"/>
+              </a:spcAft>
+              <a:buClrTx/>
+              <a:buSzTx/>
+              <a:buFontTx/>
+              <a:buNone/>
+              <a:tabLst/>
+            </a:pPr>
+            <a:endParaRPr kumimoji="0" lang="pt-PT" sz="2500" b="0" i="0" u="none" strike="noStrike" cap="none" normalizeH="0" baseline="0" dirty="0">
+              <a:ln>
+                <a:noFill/>
+              </a:ln>
+              <a:solidFill>
+                <a:schemeClr val="tx1"/>
+              </a:solidFill>
+              <a:effectLst/>
+              <a:latin typeface="Arial" panose="020B0604020202020204" pitchFamily="34" charset="0"/>
+            </a:endParaRPr>
+          </a:p>
+        </p:txBody>
+      </p:sp>
+      <p:sp>
+        <p:nvSpPr>
+          <p:cNvPr id="29" name="Retângulo 13">
+            <a:extLst>
+              <a:ext uri="{FF2B5EF4-FFF2-40B4-BE49-F238E27FC236}">
+                <a16:creationId xmlns:a16="http://schemas.microsoft.com/office/drawing/2014/main" id="{A29B2ADF-6945-77D7-7F14-F3D13CAF3C4C}"/>
+              </a:ext>
+            </a:extLst>
+          </p:cNvPr>
+          <p:cNvSpPr/>
+          <p:nvPr/>
+        </p:nvSpPr>
+        <p:spPr bwMode="auto">
+          <a:xfrm>
+            <a:off x="4196081" y="1968840"/>
+            <a:ext cx="3715698" cy="2856841"/>
+          </a:xfrm>
+          <a:custGeom>
+            <a:avLst/>
+            <a:gdLst>
+              <a:gd name="connsiteX0" fmla="*/ 0 w 3425103"/>
+              <a:gd name="connsiteY0" fmla="*/ 0 h 2772490"/>
+              <a:gd name="connsiteX1" fmla="*/ 3425103 w 3425103"/>
+              <a:gd name="connsiteY1" fmla="*/ 0 h 2772490"/>
+              <a:gd name="connsiteX2" fmla="*/ 3425103 w 3425103"/>
+              <a:gd name="connsiteY2" fmla="*/ 2772490 h 2772490"/>
+              <a:gd name="connsiteX3" fmla="*/ 0 w 3425103"/>
+              <a:gd name="connsiteY3" fmla="*/ 2772490 h 2772490"/>
+              <a:gd name="connsiteX4" fmla="*/ 0 w 3425103"/>
+              <a:gd name="connsiteY4" fmla="*/ 0 h 2772490"/>
+              <a:gd name="connsiteX0" fmla="*/ 0 w 3425103"/>
+              <a:gd name="connsiteY0" fmla="*/ 0 h 3513572"/>
+              <a:gd name="connsiteX1" fmla="*/ 3425103 w 3425103"/>
+              <a:gd name="connsiteY1" fmla="*/ 0 h 3513572"/>
+              <a:gd name="connsiteX2" fmla="*/ 3425103 w 3425103"/>
+              <a:gd name="connsiteY2" fmla="*/ 2772490 h 3513572"/>
+              <a:gd name="connsiteX3" fmla="*/ 0 w 3425103"/>
+              <a:gd name="connsiteY3" fmla="*/ 2772490 h 3513572"/>
+              <a:gd name="connsiteX4" fmla="*/ 0 w 3425103"/>
+              <a:gd name="connsiteY4" fmla="*/ 0 h 3513572"/>
+              <a:gd name="connsiteX0" fmla="*/ 0 w 3425103"/>
+              <a:gd name="connsiteY0" fmla="*/ 0 h 4043316"/>
+              <a:gd name="connsiteX1" fmla="*/ 3425103 w 3425103"/>
+              <a:gd name="connsiteY1" fmla="*/ 0 h 4043316"/>
+              <a:gd name="connsiteX2" fmla="*/ 3425103 w 3425103"/>
+              <a:gd name="connsiteY2" fmla="*/ 2772490 h 4043316"/>
+              <a:gd name="connsiteX3" fmla="*/ 0 w 3425103"/>
+              <a:gd name="connsiteY3" fmla="*/ 2772490 h 4043316"/>
+              <a:gd name="connsiteX4" fmla="*/ 0 w 3425103"/>
+              <a:gd name="connsiteY4" fmla="*/ 0 h 4043316"/>
+              <a:gd name="connsiteX0" fmla="*/ 0 w 3425103"/>
+              <a:gd name="connsiteY0" fmla="*/ 0 h 4043316"/>
+              <a:gd name="connsiteX1" fmla="*/ 3425103 w 3425103"/>
+              <a:gd name="connsiteY1" fmla="*/ 0 h 4043316"/>
+              <a:gd name="connsiteX2" fmla="*/ 3425103 w 3425103"/>
+              <a:gd name="connsiteY2" fmla="*/ 2772490 h 4043316"/>
+              <a:gd name="connsiteX3" fmla="*/ 0 w 3425103"/>
+              <a:gd name="connsiteY3" fmla="*/ 2772490 h 4043316"/>
+              <a:gd name="connsiteX4" fmla="*/ 0 w 3425103"/>
+              <a:gd name="connsiteY4" fmla="*/ 0 h 4043316"/>
+              <a:gd name="connsiteX0" fmla="*/ 0 w 3425103"/>
+              <a:gd name="connsiteY0" fmla="*/ 0 h 4043316"/>
+              <a:gd name="connsiteX1" fmla="*/ 3425103 w 3425103"/>
+              <a:gd name="connsiteY1" fmla="*/ 0 h 4043316"/>
+              <a:gd name="connsiteX2" fmla="*/ 3425103 w 3425103"/>
+              <a:gd name="connsiteY2" fmla="*/ 2772490 h 4043316"/>
+              <a:gd name="connsiteX3" fmla="*/ 0 w 3425103"/>
+              <a:gd name="connsiteY3" fmla="*/ 2772490 h 4043316"/>
+              <a:gd name="connsiteX4" fmla="*/ 0 w 3425103"/>
+              <a:gd name="connsiteY4" fmla="*/ 0 h 4043316"/>
+              <a:gd name="connsiteX0" fmla="*/ 0 w 3425103"/>
+              <a:gd name="connsiteY0" fmla="*/ 0 h 4105461"/>
+              <a:gd name="connsiteX1" fmla="*/ 3425103 w 3425103"/>
+              <a:gd name="connsiteY1" fmla="*/ 0 h 4105461"/>
+              <a:gd name="connsiteX2" fmla="*/ 3425103 w 3425103"/>
+              <a:gd name="connsiteY2" fmla="*/ 2772490 h 4105461"/>
+              <a:gd name="connsiteX3" fmla="*/ 0 w 3425103"/>
+              <a:gd name="connsiteY3" fmla="*/ 2772490 h 4105461"/>
+              <a:gd name="connsiteX4" fmla="*/ 0 w 3425103"/>
+              <a:gd name="connsiteY4" fmla="*/ 0 h 4105461"/>
+              <a:gd name="connsiteX0" fmla="*/ 0 w 3425103"/>
+              <a:gd name="connsiteY0" fmla="*/ 0 h 4204086"/>
+              <a:gd name="connsiteX1" fmla="*/ 3425103 w 3425103"/>
+              <a:gd name="connsiteY1" fmla="*/ 0 h 4204086"/>
+              <a:gd name="connsiteX2" fmla="*/ 3425103 w 3425103"/>
+              <a:gd name="connsiteY2" fmla="*/ 2772490 h 4204086"/>
+              <a:gd name="connsiteX3" fmla="*/ 0 w 3425103"/>
+              <a:gd name="connsiteY3" fmla="*/ 2772490 h 4204086"/>
+              <a:gd name="connsiteX4" fmla="*/ 0 w 3425103"/>
+              <a:gd name="connsiteY4" fmla="*/ 0 h 4204086"/>
+              <a:gd name="connsiteX0" fmla="*/ 0 w 3425103"/>
+              <a:gd name="connsiteY0" fmla="*/ 0 h 4068185"/>
+              <a:gd name="connsiteX1" fmla="*/ 3425103 w 3425103"/>
+              <a:gd name="connsiteY1" fmla="*/ 0 h 4068185"/>
+              <a:gd name="connsiteX2" fmla="*/ 3425103 w 3425103"/>
+              <a:gd name="connsiteY2" fmla="*/ 2772490 h 4068185"/>
+              <a:gd name="connsiteX3" fmla="*/ 0 w 3425103"/>
+              <a:gd name="connsiteY3" fmla="*/ 2772490 h 4068185"/>
+              <a:gd name="connsiteX4" fmla="*/ 0 w 3425103"/>
+              <a:gd name="connsiteY4" fmla="*/ 0 h 4068185"/>
+              <a:gd name="connsiteX0" fmla="*/ 0 w 3425103"/>
+              <a:gd name="connsiteY0" fmla="*/ 0 h 3948984"/>
+              <a:gd name="connsiteX1" fmla="*/ 3425103 w 3425103"/>
+              <a:gd name="connsiteY1" fmla="*/ 0 h 3948984"/>
+              <a:gd name="connsiteX2" fmla="*/ 3425103 w 3425103"/>
+              <a:gd name="connsiteY2" fmla="*/ 2772490 h 3948984"/>
+              <a:gd name="connsiteX3" fmla="*/ 0 w 3425103"/>
+              <a:gd name="connsiteY3" fmla="*/ 2772490 h 3948984"/>
+              <a:gd name="connsiteX4" fmla="*/ 0 w 3425103"/>
+              <a:gd name="connsiteY4" fmla="*/ 0 h 3948984"/>
+              <a:gd name="connsiteX0" fmla="*/ 0 w 3425103"/>
+              <a:gd name="connsiteY0" fmla="*/ 0 h 3948983"/>
+              <a:gd name="connsiteX1" fmla="*/ 3425103 w 3425103"/>
+              <a:gd name="connsiteY1" fmla="*/ 0 h 3948983"/>
+              <a:gd name="connsiteX2" fmla="*/ 3425103 w 3425103"/>
+              <a:gd name="connsiteY2" fmla="*/ 2772490 h 3948983"/>
+              <a:gd name="connsiteX3" fmla="*/ 0 w 3425103"/>
+              <a:gd name="connsiteY3" fmla="*/ 2772490 h 3948983"/>
+              <a:gd name="connsiteX4" fmla="*/ 0 w 3425103"/>
+              <a:gd name="connsiteY4" fmla="*/ 0 h 3948983"/>
+              <a:gd name="connsiteX0" fmla="*/ 0 w 3425103"/>
+              <a:gd name="connsiteY0" fmla="*/ 0 h 3948983"/>
+              <a:gd name="connsiteX1" fmla="*/ 3425103 w 3425103"/>
+              <a:gd name="connsiteY1" fmla="*/ 0 h 3948983"/>
+              <a:gd name="connsiteX2" fmla="*/ 3425103 w 3425103"/>
+              <a:gd name="connsiteY2" fmla="*/ 2772490 h 3948983"/>
+              <a:gd name="connsiteX3" fmla="*/ 0 w 3425103"/>
+              <a:gd name="connsiteY3" fmla="*/ 2772490 h 3948983"/>
+              <a:gd name="connsiteX4" fmla="*/ 0 w 3425103"/>
+              <a:gd name="connsiteY4" fmla="*/ 0 h 3948983"/>
+              <a:gd name="connsiteX0" fmla="*/ 0 w 3425103"/>
+              <a:gd name="connsiteY0" fmla="*/ 0 h 3948983"/>
+              <a:gd name="connsiteX1" fmla="*/ 3425103 w 3425103"/>
+              <a:gd name="connsiteY1" fmla="*/ 0 h 3948983"/>
+              <a:gd name="connsiteX2" fmla="*/ 3425103 w 3425103"/>
+              <a:gd name="connsiteY2" fmla="*/ 2772490 h 3948983"/>
+              <a:gd name="connsiteX3" fmla="*/ 0 w 3425103"/>
+              <a:gd name="connsiteY3" fmla="*/ 2772490 h 3948983"/>
+              <a:gd name="connsiteX4" fmla="*/ 0 w 3425103"/>
+              <a:gd name="connsiteY4" fmla="*/ 0 h 3948983"/>
+              <a:gd name="connsiteX0" fmla="*/ 0 w 3425103"/>
+              <a:gd name="connsiteY0" fmla="*/ 0 h 3948983"/>
+              <a:gd name="connsiteX1" fmla="*/ 3425103 w 3425103"/>
+              <a:gd name="connsiteY1" fmla="*/ 0 h 3948983"/>
+              <a:gd name="connsiteX2" fmla="*/ 3425103 w 3425103"/>
+              <a:gd name="connsiteY2" fmla="*/ 2772490 h 3948983"/>
+              <a:gd name="connsiteX3" fmla="*/ 0 w 3425103"/>
+              <a:gd name="connsiteY3" fmla="*/ 2772490 h 3948983"/>
+              <a:gd name="connsiteX4" fmla="*/ 0 w 3425103"/>
+              <a:gd name="connsiteY4" fmla="*/ 0 h 3948983"/>
+              <a:gd name="connsiteX0" fmla="*/ 0 w 3425103"/>
+              <a:gd name="connsiteY0" fmla="*/ 0 h 3948983"/>
+              <a:gd name="connsiteX1" fmla="*/ 3425103 w 3425103"/>
+              <a:gd name="connsiteY1" fmla="*/ 0 h 3948983"/>
+              <a:gd name="connsiteX2" fmla="*/ 3425103 w 3425103"/>
+              <a:gd name="connsiteY2" fmla="*/ 2772490 h 3948983"/>
+              <a:gd name="connsiteX3" fmla="*/ 0 w 3425103"/>
+              <a:gd name="connsiteY3" fmla="*/ 2772490 h 3948983"/>
+              <a:gd name="connsiteX4" fmla="*/ 0 w 3425103"/>
+              <a:gd name="connsiteY4" fmla="*/ 0 h 3948983"/>
+              <a:gd name="connsiteX0" fmla="*/ 0 w 3425103"/>
+              <a:gd name="connsiteY0" fmla="*/ 0 h 3948983"/>
+              <a:gd name="connsiteX1" fmla="*/ 3425103 w 3425103"/>
+              <a:gd name="connsiteY1" fmla="*/ 0 h 3948983"/>
+              <a:gd name="connsiteX2" fmla="*/ 3425103 w 3425103"/>
+              <a:gd name="connsiteY2" fmla="*/ 2772490 h 3948983"/>
+              <a:gd name="connsiteX3" fmla="*/ 0 w 3425103"/>
+              <a:gd name="connsiteY3" fmla="*/ 2772490 h 3948983"/>
+              <a:gd name="connsiteX4" fmla="*/ 0 w 3425103"/>
+              <a:gd name="connsiteY4" fmla="*/ 0 h 3948983"/>
+            </a:gdLst>
+            <a:ahLst/>
+            <a:cxnLst>
+              <a:cxn ang="0">
+                <a:pos x="connsiteX0" y="connsiteY0"/>
+              </a:cxn>
+              <a:cxn ang="0">
+                <a:pos x="connsiteX1" y="connsiteY1"/>
+              </a:cxn>
+              <a:cxn ang="0">
+                <a:pos x="connsiteX2" y="connsiteY2"/>
+              </a:cxn>
+              <a:cxn ang="0">
+                <a:pos x="connsiteX3" y="connsiteY3"/>
+              </a:cxn>
+              <a:cxn ang="0">
+                <a:pos x="connsiteX4" y="connsiteY4"/>
+              </a:cxn>
+            </a:cxnLst>
+            <a:rect l="l" t="t" r="r" b="b"/>
+            <a:pathLst>
+              <a:path w="3425103" h="3948983">
+                <a:moveTo>
+                  <a:pt x="0" y="0"/>
+                </a:moveTo>
+                <a:cubicBezTo>
+                  <a:pt x="1433901" y="1035303"/>
+                  <a:pt x="2212140" y="1028615"/>
+                  <a:pt x="3425103" y="0"/>
+                </a:cubicBezTo>
+                <a:lnTo>
+                  <a:pt x="3425103" y="2772490"/>
+                </a:lnTo>
+                <a:cubicBezTo>
+                  <a:pt x="2645745" y="4336428"/>
+                  <a:pt x="736152" y="4345861"/>
+                  <a:pt x="0" y="2772490"/>
+                </a:cubicBezTo>
+                <a:lnTo>
+                  <a:pt x="0" y="0"/>
+                </a:lnTo>
+                <a:close/>
+              </a:path>
+            </a:pathLst>
+          </a:custGeom>
+          <a:solidFill>
+            <a:srgbClr val="E7F3F4"/>
+          </a:solidFill>
+          <a:ln w="9525" cap="flat" cmpd="sng" algn="ctr">
+            <a:noFill/>
+            <a:prstDash val="solid"/>
+            <a:round/>
+            <a:headEnd type="none" w="med" len="med"/>
+            <a:tailEnd type="none" w="med" len="med"/>
+          </a:ln>
+          <a:effectLst/>
+        </p:spPr>
+        <p:txBody>
+          <a:bodyPr vert="horz" wrap="square" lIns="91440" tIns="45720" rIns="91440" bIns="45720" numCol="1" rtlCol="0" anchor="t" anchorCtr="0" compatLnSpc="1">
+            <a:prstTxWarp prst="textNoShape">
+              <a:avLst/>
+            </a:prstTxWarp>
+          </a:bodyPr>
+          <a:lstStyle/>
+          <a:p>
+            <a:pPr marL="0" marR="0" indent="0" algn="l" defTabSz="1279525" rtl="0" eaLnBrk="1" fontAlgn="base" latinLnBrk="0" hangingPunct="1">
+              <a:lnSpc>
+                <a:spcPct val="100000"/>
+              </a:lnSpc>
+              <a:spcBef>
+                <a:spcPct val="0"/>
+              </a:spcBef>
+              <a:spcAft>
+                <a:spcPct val="0"/>
+              </a:spcAft>
+              <a:buClrTx/>
+              <a:buSzTx/>
+              <a:buFontTx/>
+              <a:buNone/>
+              <a:tabLst/>
+            </a:pPr>
+            <a:endParaRPr kumimoji="0" lang="pt-PT" sz="2500" b="0" i="0" u="none" strike="noStrike" cap="none" normalizeH="0" baseline="0" dirty="0">
+              <a:ln>
+                <a:noFill/>
+              </a:ln>
+              <a:solidFill>
+                <a:schemeClr val="tx1"/>
+              </a:solidFill>
+              <a:effectLst/>
+              <a:latin typeface="Arial" panose="020B0604020202020204" pitchFamily="34" charset="0"/>
+            </a:endParaRPr>
+          </a:p>
+        </p:txBody>
+      </p:sp>
+      <p:sp>
+        <p:nvSpPr>
+          <p:cNvPr id="35" name="CaixaDeTexto 34">
+            <a:extLst>
+              <a:ext uri="{FF2B5EF4-FFF2-40B4-BE49-F238E27FC236}">
+                <a16:creationId xmlns:a16="http://schemas.microsoft.com/office/drawing/2014/main" id="{0C4F1B2E-64A1-FE29-7D7C-E42C896DABC7}"/>
+              </a:ext>
+            </a:extLst>
+          </p:cNvPr>
+          <p:cNvSpPr txBox="1"/>
+          <p:nvPr/>
+        </p:nvSpPr>
+        <p:spPr>
+          <a:xfrm>
+            <a:off x="4973200" y="2611992"/>
+            <a:ext cx="2628218" cy="400110"/>
+          </a:xfrm>
+          <a:prstGeom prst="rect">
+            <a:avLst/>
+          </a:prstGeom>
+          <a:noFill/>
+        </p:spPr>
+        <p:txBody>
+          <a:bodyPr wrap="square" rtlCol="0">
+            <a:spAutoFit/>
+          </a:bodyPr>
+          <a:lstStyle/>
+          <a:p>
+            <a:r>
+              <a:rPr lang="pt-PT" sz="2000" b="1" u="sng" dirty="0">
+                <a:solidFill>
+                  <a:srgbClr val="165A69"/>
+                </a:solidFill>
+              </a:rPr>
+              <a:t>Jogo de memória</a:t>
+            </a:r>
+          </a:p>
+        </p:txBody>
+      </p:sp>
+      <p:sp>
+        <p:nvSpPr>
+          <p:cNvPr id="40" name="CaixaDeTexto 39">
+            <a:extLst>
+              <a:ext uri="{FF2B5EF4-FFF2-40B4-BE49-F238E27FC236}">
+                <a16:creationId xmlns:a16="http://schemas.microsoft.com/office/drawing/2014/main" id="{1442ABB7-44BD-A1C1-DD81-B39AD9763A27}"/>
+              </a:ext>
+            </a:extLst>
+          </p:cNvPr>
+          <p:cNvSpPr txBox="1"/>
+          <p:nvPr/>
+        </p:nvSpPr>
+        <p:spPr>
+          <a:xfrm>
+            <a:off x="4324120" y="2949012"/>
+            <a:ext cx="3527403" cy="1538883"/>
+          </a:xfrm>
+          <a:prstGeom prst="rect">
+            <a:avLst/>
+          </a:prstGeom>
+          <a:noFill/>
+        </p:spPr>
+        <p:txBody>
+          <a:bodyPr wrap="square" rtlCol="0">
+            <a:spAutoFit/>
+          </a:bodyPr>
+          <a:lstStyle/>
+          <a:p>
+            <a:pPr algn="just"/>
+            <a:r>
+              <a:rPr lang="pt-PT" sz="1150" b="1" kern="1200" dirty="0">
+                <a:solidFill>
+                  <a:srgbClr val="165A69"/>
+                </a:solidFill>
+                <a:effectLst/>
+                <a:latin typeface="+mn-lt"/>
+                <a:ea typeface="+mn-ea"/>
+                <a:cs typeface="+mn-cs"/>
+              </a:rPr>
+              <a:t>Para completar o jogo, com sucesso, o jogador precisa de usar a câmara do dispositivo móvel, apontando-a para os marcadores presentes na parte inferior de cada carta, de modo a revelar os modelos 3D dos animais associados a cada marcador. </a:t>
+            </a:r>
+          </a:p>
+          <a:p>
+            <a:endParaRPr lang="pt-PT" dirty="0"/>
+          </a:p>
+        </p:txBody>
+      </p:sp>
+      <p:sp>
+        <p:nvSpPr>
+          <p:cNvPr id="41" name="CaixaDeTexto 40">
+            <a:extLst>
+              <a:ext uri="{FF2B5EF4-FFF2-40B4-BE49-F238E27FC236}">
+                <a16:creationId xmlns:a16="http://schemas.microsoft.com/office/drawing/2014/main" id="{48C5DB9E-CBBA-DC1E-575D-328EADDA65B9}"/>
+              </a:ext>
+            </a:extLst>
+          </p:cNvPr>
+          <p:cNvSpPr txBox="1"/>
+          <p:nvPr/>
+        </p:nvSpPr>
+        <p:spPr>
+          <a:xfrm>
+            <a:off x="5322353" y="4795892"/>
+            <a:ext cx="1572694" cy="400110"/>
+          </a:xfrm>
+          <a:prstGeom prst="rect">
+            <a:avLst/>
+          </a:prstGeom>
+          <a:noFill/>
+        </p:spPr>
+        <p:txBody>
+          <a:bodyPr wrap="square" rtlCol="0">
+            <a:spAutoFit/>
+          </a:bodyPr>
+          <a:lstStyle/>
+          <a:p>
+            <a:r>
+              <a:rPr lang="pt-PT" sz="2000" b="1" u="sng" dirty="0">
+                <a:solidFill>
+                  <a:srgbClr val="165A69"/>
+                </a:solidFill>
+              </a:rPr>
+              <a:t>Minijogos</a:t>
+            </a:r>
+          </a:p>
+        </p:txBody>
+      </p:sp>
+      <p:sp>
+        <p:nvSpPr>
+          <p:cNvPr id="42" name="CaixaDeTexto 41">
+            <a:extLst>
+              <a:ext uri="{FF2B5EF4-FFF2-40B4-BE49-F238E27FC236}">
+                <a16:creationId xmlns:a16="http://schemas.microsoft.com/office/drawing/2014/main" id="{61ACCABE-F84E-F83B-0259-59ACDCD8AC8E}"/>
+              </a:ext>
+            </a:extLst>
+          </p:cNvPr>
+          <p:cNvSpPr txBox="1"/>
+          <p:nvPr/>
+        </p:nvSpPr>
+        <p:spPr>
+          <a:xfrm>
+            <a:off x="4284883" y="5131943"/>
+            <a:ext cx="3527403" cy="1361911"/>
+          </a:xfrm>
+          <a:prstGeom prst="rect">
+            <a:avLst/>
+          </a:prstGeom>
+          <a:noFill/>
+        </p:spPr>
+        <p:txBody>
+          <a:bodyPr wrap="square" rtlCol="0">
+            <a:spAutoFit/>
+          </a:bodyPr>
+          <a:lstStyle/>
+          <a:p>
+            <a:pPr marL="0" indent="0" algn="just">
+              <a:buFont typeface="Arial" panose="020B0604020202020204" pitchFamily="34" charset="0"/>
+              <a:buNone/>
+            </a:pPr>
+            <a:r>
+              <a:rPr lang="pt-PT" sz="1150" b="1" kern="1200" dirty="0">
+                <a:solidFill>
+                  <a:srgbClr val="165A69"/>
+                </a:solidFill>
+                <a:effectLst/>
+                <a:latin typeface="+mn-lt"/>
+                <a:ea typeface="+mn-ea"/>
+                <a:cs typeface="+mn-cs"/>
+              </a:rPr>
+              <a:t>Existem três minijogos, cada um representativo de um procedimento médico </a:t>
+            </a:r>
+            <a:r>
+              <a:rPr lang="pt-PT" sz="1150" b="1" dirty="0">
+                <a:solidFill>
+                  <a:srgbClr val="165A69"/>
+                </a:solidFill>
+                <a:latin typeface="+mn-lt"/>
+              </a:rPr>
+              <a:t>que a criança irá vivenciar</a:t>
+            </a:r>
+            <a:r>
+              <a:rPr lang="pt-PT" sz="1150" b="1" kern="1200" dirty="0">
+                <a:solidFill>
+                  <a:srgbClr val="165A69"/>
+                </a:solidFill>
+                <a:effectLst/>
+                <a:latin typeface="+mn-lt"/>
+                <a:ea typeface="+mn-ea"/>
+                <a:cs typeface="+mn-cs"/>
+              </a:rPr>
+              <a:t>. Para completar os minijogos são usadas mecânicas simples como carregar em objetos e arrastá-los para determinados locais.</a:t>
+            </a:r>
+          </a:p>
+          <a:p>
+            <a:endParaRPr lang="pt-PT" dirty="0"/>
+          </a:p>
+        </p:txBody>
+      </p:sp>
+      <p:sp>
+        <p:nvSpPr>
+          <p:cNvPr id="43" name="CaixaDeTexto 42">
+            <a:extLst>
+              <a:ext uri="{FF2B5EF4-FFF2-40B4-BE49-F238E27FC236}">
+                <a16:creationId xmlns:a16="http://schemas.microsoft.com/office/drawing/2014/main" id="{5DAB40A8-7233-B725-3798-70DE3843AFD0}"/>
+              </a:ext>
+            </a:extLst>
+          </p:cNvPr>
+          <p:cNvSpPr txBox="1"/>
+          <p:nvPr/>
+        </p:nvSpPr>
+        <p:spPr>
+          <a:xfrm>
+            <a:off x="4673519" y="6749558"/>
+            <a:ext cx="3296594" cy="400110"/>
+          </a:xfrm>
+          <a:prstGeom prst="rect">
+            <a:avLst/>
+          </a:prstGeom>
+          <a:noFill/>
+        </p:spPr>
+        <p:txBody>
+          <a:bodyPr wrap="square" rtlCol="0">
+            <a:spAutoFit/>
+          </a:bodyPr>
+          <a:lstStyle/>
+          <a:p>
+            <a:r>
+              <a:rPr lang="pt-PT" sz="2000" b="1" u="sng" dirty="0">
+                <a:solidFill>
+                  <a:srgbClr val="165A69"/>
+                </a:solidFill>
+              </a:rPr>
+              <a:t>Recompensar jogador</a:t>
+            </a:r>
+          </a:p>
+        </p:txBody>
+      </p:sp>
+      <p:sp>
+        <p:nvSpPr>
+          <p:cNvPr id="45" name="CaixaDeTexto 44">
+            <a:extLst>
+              <a:ext uri="{FF2B5EF4-FFF2-40B4-BE49-F238E27FC236}">
+                <a16:creationId xmlns:a16="http://schemas.microsoft.com/office/drawing/2014/main" id="{AD46F166-B588-74BA-C501-4BD8841384E5}"/>
+              </a:ext>
+            </a:extLst>
+          </p:cNvPr>
+          <p:cNvSpPr txBox="1"/>
+          <p:nvPr/>
+        </p:nvSpPr>
+        <p:spPr>
+          <a:xfrm>
+            <a:off x="4344999" y="7073261"/>
+            <a:ext cx="3527403" cy="1715854"/>
+          </a:xfrm>
+          <a:prstGeom prst="rect">
+            <a:avLst/>
+          </a:prstGeom>
+          <a:noFill/>
+        </p:spPr>
+        <p:txBody>
+          <a:bodyPr wrap="square" rtlCol="0">
+            <a:spAutoFit/>
+          </a:bodyPr>
+          <a:lstStyle/>
+          <a:p>
+            <a:pPr marL="0" indent="0" algn="just">
+              <a:buFont typeface="Arial" panose="020B0604020202020204" pitchFamily="34" charset="0"/>
+              <a:buNone/>
+            </a:pPr>
+            <a:r>
+              <a:rPr lang="pt-PT" sz="1150" b="1" kern="1200" dirty="0">
+                <a:solidFill>
+                  <a:srgbClr val="165A69"/>
+                </a:solidFill>
+                <a:effectLst/>
+                <a:latin typeface="+mn-lt"/>
+                <a:ea typeface="+mn-ea"/>
+                <a:cs typeface="+mn-cs"/>
+              </a:rPr>
+              <a:t>Esta etapa foi desenvolvida para proporcionar uma sensação de progresso no jogo. Irão aparecer arbustos no espaço ao redor do jogador, e ele precisará usar a câmara do dispositivo para os procurar e carregar neles até encontrar o arbusto que contem </a:t>
+            </a:r>
+            <a:r>
+              <a:rPr lang="pt-PT" sz="1150" b="1" dirty="0">
+                <a:solidFill>
+                  <a:srgbClr val="165A69"/>
+                </a:solidFill>
+                <a:latin typeface="+mn-lt"/>
+              </a:rPr>
+              <a:t>a recompensa</a:t>
+            </a:r>
+            <a:r>
+              <a:rPr lang="pt-PT" sz="1150" b="1" kern="1200" dirty="0">
+                <a:solidFill>
+                  <a:srgbClr val="165A69"/>
+                </a:solidFill>
+                <a:effectLst/>
+                <a:latin typeface="+mn-lt"/>
+                <a:ea typeface="+mn-ea"/>
+                <a:cs typeface="+mn-cs"/>
+              </a:rPr>
+              <a:t>.</a:t>
+            </a:r>
+          </a:p>
+          <a:p>
+            <a:endParaRPr lang="pt-PT" dirty="0"/>
+          </a:p>
+        </p:txBody>
+      </p:sp>
+      <p:sp>
+        <p:nvSpPr>
+          <p:cNvPr id="50" name="Retângulo 21">
+            <a:extLst>
+              <a:ext uri="{FF2B5EF4-FFF2-40B4-BE49-F238E27FC236}">
+                <a16:creationId xmlns:a16="http://schemas.microsoft.com/office/drawing/2014/main" id="{6216C8AC-1ED6-F553-1135-6498C5ED26F2}"/>
+              </a:ext>
+            </a:extLst>
+          </p:cNvPr>
+          <p:cNvSpPr/>
+          <p:nvPr/>
+        </p:nvSpPr>
+        <p:spPr bwMode="auto">
+          <a:xfrm>
+            <a:off x="4188062" y="5954723"/>
+            <a:ext cx="543484" cy="812431"/>
           </a:xfrm>
           <a:custGeom>
             <a:avLst/>
@@ -5518,6 +5911,46 @@
               <a:gd name="connsiteY3" fmla="*/ 385943 h 385943"/>
               <a:gd name="connsiteX4" fmla="*/ 0 w 198061"/>
               <a:gd name="connsiteY4" fmla="*/ 0 h 385943"/>
+              <a:gd name="connsiteX0" fmla="*/ 2094 w 198061"/>
+              <a:gd name="connsiteY0" fmla="*/ 0 h 415302"/>
+              <a:gd name="connsiteX1" fmla="*/ 194251 w 198061"/>
+              <a:gd name="connsiteY1" fmla="*/ 29359 h 415302"/>
+              <a:gd name="connsiteX2" fmla="*/ 198061 w 198061"/>
+              <a:gd name="connsiteY2" fmla="*/ 415302 h 415302"/>
+              <a:gd name="connsiteX3" fmla="*/ 0 w 198061"/>
+              <a:gd name="connsiteY3" fmla="*/ 415302 h 415302"/>
+              <a:gd name="connsiteX4" fmla="*/ 2094 w 198061"/>
+              <a:gd name="connsiteY4" fmla="*/ 0 h 415302"/>
+              <a:gd name="connsiteX0" fmla="*/ 2094 w 203673"/>
+              <a:gd name="connsiteY0" fmla="*/ 0 h 415302"/>
+              <a:gd name="connsiteX1" fmla="*/ 203673 w 203673"/>
+              <a:gd name="connsiteY1" fmla="*/ 122329 h 415302"/>
+              <a:gd name="connsiteX2" fmla="*/ 198061 w 203673"/>
+              <a:gd name="connsiteY2" fmla="*/ 415302 h 415302"/>
+              <a:gd name="connsiteX3" fmla="*/ 0 w 203673"/>
+              <a:gd name="connsiteY3" fmla="*/ 415302 h 415302"/>
+              <a:gd name="connsiteX4" fmla="*/ 2094 w 203673"/>
+              <a:gd name="connsiteY4" fmla="*/ 0 h 415302"/>
+              <a:gd name="connsiteX0" fmla="*/ 0 w 206697"/>
+              <a:gd name="connsiteY0" fmla="*/ 0 h 463511"/>
+              <a:gd name="connsiteX1" fmla="*/ 206697 w 206697"/>
+              <a:gd name="connsiteY1" fmla="*/ 170538 h 463511"/>
+              <a:gd name="connsiteX2" fmla="*/ 201085 w 206697"/>
+              <a:gd name="connsiteY2" fmla="*/ 463511 h 463511"/>
+              <a:gd name="connsiteX3" fmla="*/ 3024 w 206697"/>
+              <a:gd name="connsiteY3" fmla="*/ 463511 h 463511"/>
+              <a:gd name="connsiteX4" fmla="*/ 0 w 206697"/>
+              <a:gd name="connsiteY4" fmla="*/ 0 h 463511"/>
+              <a:gd name="connsiteX0" fmla="*/ 0 w 204138"/>
+              <a:gd name="connsiteY0" fmla="*/ 0 h 463511"/>
+              <a:gd name="connsiteX1" fmla="*/ 204138 w 204138"/>
+              <a:gd name="connsiteY1" fmla="*/ 270171 h 463511"/>
+              <a:gd name="connsiteX2" fmla="*/ 201085 w 204138"/>
+              <a:gd name="connsiteY2" fmla="*/ 463511 h 463511"/>
+              <a:gd name="connsiteX3" fmla="*/ 3024 w 204138"/>
+              <a:gd name="connsiteY3" fmla="*/ 463511 h 463511"/>
+              <a:gd name="connsiteX4" fmla="*/ 0 w 204138"/>
+              <a:gd name="connsiteY4" fmla="*/ 0 h 463511"/>
             </a:gdLst>
             <a:ahLst/>
             <a:cxnLst>
@@ -5539,20 +5972,22 @@
             </a:cxnLst>
             <a:rect l="l" t="t" r="r" b="b"/>
             <a:pathLst>
-              <a:path w="198061" h="385943">
+              <a:path w="204138" h="463511">
                 <a:moveTo>
                   <a:pt x="0" y="0"/>
                 </a:moveTo>
                 <a:lnTo>
-                  <a:pt x="194251" y="0"/>
-                </a:lnTo>
-                <a:lnTo>
-                  <a:pt x="198061" y="385943"/>
+                  <a:pt x="204138" y="270171"/>
                 </a:lnTo>
                 <a:cubicBezTo>
-                  <a:pt x="55841" y="244973"/>
-                  <a:pt x="140315" y="260213"/>
-                  <a:pt x="0" y="385943"/>
+                  <a:pt x="203120" y="334618"/>
+                  <a:pt x="202103" y="399064"/>
+                  <a:pt x="201085" y="463511"/>
+                </a:cubicBezTo>
+                <a:cubicBezTo>
+                  <a:pt x="58865" y="322541"/>
+                  <a:pt x="143339" y="337781"/>
+                  <a:pt x="3024" y="463511"/>
                 </a:cubicBezTo>
                 <a:lnTo>
                   <a:pt x="0" y="0"/>
@@ -5562,7 +5997,7 @@
             </a:pathLst>
           </a:custGeom>
           <a:solidFill>
-            <a:srgbClr val="82DCFF"/>
+            <a:srgbClr val="A7FF81"/>
           </a:solidFill>
           <a:ln w="9525" cap="flat" cmpd="sng" algn="ctr">
             <a:noFill/>
@@ -5597,7 +6032,7 @@
               <a:buNone/>
               <a:tabLst/>
             </a:pPr>
-            <a:endParaRPr kumimoji="0" lang="pt-PT" sz="2500" b="0" i="0" u="none" strike="noStrike" cap="none" normalizeH="0" baseline="0">
+            <a:endParaRPr kumimoji="0" lang="pt-PT" sz="2500" b="0" i="0" u="none" strike="noStrike" cap="none" normalizeH="0" baseline="0" dirty="0">
               <a:ln>
                 <a:noFill/>
               </a:ln>
@@ -5612,10 +6047,10 @@
       </p:sp>
       <p:sp>
         <p:nvSpPr>
-          <p:cNvPr id="32" name="Retângulo 21">
+          <p:cNvPr id="53" name="Retângulo 21">
             <a:extLst>
               <a:ext uri="{FF2B5EF4-FFF2-40B4-BE49-F238E27FC236}">
-                <a16:creationId xmlns:a16="http://schemas.microsoft.com/office/drawing/2014/main" id="{CD98FA84-6C87-D1E5-42AD-9888CEA57514}"/>
+                <a16:creationId xmlns:a16="http://schemas.microsoft.com/office/drawing/2014/main" id="{67EC0A2A-2AAD-26D6-CC92-7583ECF83804}"/>
               </a:ext>
             </a:extLst>
           </p:cNvPr>
@@ -5624,8 +6059,8 @@
         </p:nvSpPr>
         <p:spPr bwMode="auto">
           <a:xfrm>
-            <a:off x="7326216" y="6806804"/>
-            <a:ext cx="198061" cy="254691"/>
+            <a:off x="4190811" y="3966887"/>
+            <a:ext cx="554023" cy="831480"/>
           </a:xfrm>
           <a:custGeom>
             <a:avLst/>
@@ -5690,6 +6125,66 @@
               <a:gd name="connsiteY3" fmla="*/ 385943 h 385943"/>
               <a:gd name="connsiteX4" fmla="*/ 0 w 198061"/>
               <a:gd name="connsiteY4" fmla="*/ 0 h 385943"/>
+              <a:gd name="connsiteX0" fmla="*/ 2094 w 198061"/>
+              <a:gd name="connsiteY0" fmla="*/ 0 h 415302"/>
+              <a:gd name="connsiteX1" fmla="*/ 194251 w 198061"/>
+              <a:gd name="connsiteY1" fmla="*/ 29359 h 415302"/>
+              <a:gd name="connsiteX2" fmla="*/ 198061 w 198061"/>
+              <a:gd name="connsiteY2" fmla="*/ 415302 h 415302"/>
+              <a:gd name="connsiteX3" fmla="*/ 0 w 198061"/>
+              <a:gd name="connsiteY3" fmla="*/ 415302 h 415302"/>
+              <a:gd name="connsiteX4" fmla="*/ 2094 w 198061"/>
+              <a:gd name="connsiteY4" fmla="*/ 0 h 415302"/>
+              <a:gd name="connsiteX0" fmla="*/ 2094 w 203673"/>
+              <a:gd name="connsiteY0" fmla="*/ 0 h 415302"/>
+              <a:gd name="connsiteX1" fmla="*/ 203673 w 203673"/>
+              <a:gd name="connsiteY1" fmla="*/ 122329 h 415302"/>
+              <a:gd name="connsiteX2" fmla="*/ 198061 w 203673"/>
+              <a:gd name="connsiteY2" fmla="*/ 415302 h 415302"/>
+              <a:gd name="connsiteX3" fmla="*/ 0 w 203673"/>
+              <a:gd name="connsiteY3" fmla="*/ 415302 h 415302"/>
+              <a:gd name="connsiteX4" fmla="*/ 2094 w 203673"/>
+              <a:gd name="connsiteY4" fmla="*/ 0 h 415302"/>
+              <a:gd name="connsiteX0" fmla="*/ 0 w 206697"/>
+              <a:gd name="connsiteY0" fmla="*/ 0 h 463511"/>
+              <a:gd name="connsiteX1" fmla="*/ 206697 w 206697"/>
+              <a:gd name="connsiteY1" fmla="*/ 170538 h 463511"/>
+              <a:gd name="connsiteX2" fmla="*/ 201085 w 206697"/>
+              <a:gd name="connsiteY2" fmla="*/ 463511 h 463511"/>
+              <a:gd name="connsiteX3" fmla="*/ 3024 w 206697"/>
+              <a:gd name="connsiteY3" fmla="*/ 463511 h 463511"/>
+              <a:gd name="connsiteX4" fmla="*/ 0 w 206697"/>
+              <a:gd name="connsiteY4" fmla="*/ 0 h 463511"/>
+              <a:gd name="connsiteX0" fmla="*/ 0 w 204138"/>
+              <a:gd name="connsiteY0" fmla="*/ 0 h 463511"/>
+              <a:gd name="connsiteX1" fmla="*/ 204138 w 204138"/>
+              <a:gd name="connsiteY1" fmla="*/ 270171 h 463511"/>
+              <a:gd name="connsiteX2" fmla="*/ 201085 w 204138"/>
+              <a:gd name="connsiteY2" fmla="*/ 463511 h 463511"/>
+              <a:gd name="connsiteX3" fmla="*/ 3024 w 204138"/>
+              <a:gd name="connsiteY3" fmla="*/ 463511 h 463511"/>
+              <a:gd name="connsiteX4" fmla="*/ 0 w 204138"/>
+              <a:gd name="connsiteY4" fmla="*/ 0 h 463511"/>
+              <a:gd name="connsiteX0" fmla="*/ 0 w 204138"/>
+              <a:gd name="connsiteY0" fmla="*/ 0 h 463511"/>
+              <a:gd name="connsiteX1" fmla="*/ 204138 w 204138"/>
+              <a:gd name="connsiteY1" fmla="*/ 284662 h 463511"/>
+              <a:gd name="connsiteX2" fmla="*/ 201085 w 204138"/>
+              <a:gd name="connsiteY2" fmla="*/ 463511 h 463511"/>
+              <a:gd name="connsiteX3" fmla="*/ 3024 w 204138"/>
+              <a:gd name="connsiteY3" fmla="*/ 463511 h 463511"/>
+              <a:gd name="connsiteX4" fmla="*/ 0 w 204138"/>
+              <a:gd name="connsiteY4" fmla="*/ 0 h 463511"/>
+              <a:gd name="connsiteX0" fmla="*/ 0 w 204138"/>
+              <a:gd name="connsiteY0" fmla="*/ 0 h 474379"/>
+              <a:gd name="connsiteX1" fmla="*/ 204138 w 204138"/>
+              <a:gd name="connsiteY1" fmla="*/ 295530 h 474379"/>
+              <a:gd name="connsiteX2" fmla="*/ 201085 w 204138"/>
+              <a:gd name="connsiteY2" fmla="*/ 474379 h 474379"/>
+              <a:gd name="connsiteX3" fmla="*/ 3024 w 204138"/>
+              <a:gd name="connsiteY3" fmla="*/ 474379 h 474379"/>
+              <a:gd name="connsiteX4" fmla="*/ 0 w 204138"/>
+              <a:gd name="connsiteY4" fmla="*/ 0 h 474379"/>
             </a:gdLst>
             <a:ahLst/>
             <a:cxnLst>
@@ -5711,20 +6206,24 @@
             </a:cxnLst>
             <a:rect l="l" t="t" r="r" b="b"/>
             <a:pathLst>
-              <a:path w="198061" h="385943">
+              <a:path w="204138" h="474379">
                 <a:moveTo>
                   <a:pt x="0" y="0"/>
                 </a:moveTo>
-                <a:lnTo>
-                  <a:pt x="194251" y="0"/>
-                </a:lnTo>
-                <a:lnTo>
-                  <a:pt x="198061" y="385943"/>
-                </a:lnTo>
                 <a:cubicBezTo>
-                  <a:pt x="55841" y="244973"/>
-                  <a:pt x="140315" y="260213"/>
-                  <a:pt x="0" y="385943"/>
+                  <a:pt x="68046" y="90057"/>
+                  <a:pt x="136092" y="205473"/>
+                  <a:pt x="204138" y="295530"/>
+                </a:cubicBezTo>
+                <a:cubicBezTo>
+                  <a:pt x="203120" y="359977"/>
+                  <a:pt x="202103" y="409932"/>
+                  <a:pt x="201085" y="474379"/>
+                </a:cubicBezTo>
+                <a:cubicBezTo>
+                  <a:pt x="58865" y="333409"/>
+                  <a:pt x="143339" y="348649"/>
+                  <a:pt x="3024" y="474379"/>
                 </a:cubicBezTo>
                 <a:lnTo>
                   <a:pt x="0" y="0"/>
@@ -5734,7 +6233,7 @@
             </a:pathLst>
           </a:custGeom>
           <a:solidFill>
-            <a:srgbClr val="A7FF81"/>
+            <a:srgbClr val="82DCFF"/>
           </a:solidFill>
           <a:ln w="9525" cap="flat" cmpd="sng" algn="ctr">
             <a:noFill/>
@@ -5769,7 +6268,7 @@
               <a:buNone/>
               <a:tabLst/>
             </a:pPr>
-            <a:endParaRPr kumimoji="0" lang="pt-PT" sz="2500" b="0" i="0" u="none" strike="noStrike" cap="none" normalizeH="0" baseline="0">
+            <a:endParaRPr kumimoji="0" lang="pt-PT" sz="2500" b="0" i="0" u="none" strike="noStrike" cap="none" normalizeH="0" baseline="0" dirty="0">
               <a:ln>
                 <a:noFill/>
               </a:ln>
@@ -5784,10 +6283,10 @@
       </p:sp>
       <p:sp>
         <p:nvSpPr>
-          <p:cNvPr id="33" name="Retângulo 21">
+          <p:cNvPr id="54" name="Retângulo 21">
             <a:extLst>
               <a:ext uri="{FF2B5EF4-FFF2-40B4-BE49-F238E27FC236}">
-                <a16:creationId xmlns:a16="http://schemas.microsoft.com/office/drawing/2014/main" id="{1D368519-4430-447E-833E-124B1A36800C}"/>
+                <a16:creationId xmlns:a16="http://schemas.microsoft.com/office/drawing/2014/main" id="{5059BEF3-69A6-8B7D-B73C-E35B87B6C07E}"/>
               </a:ext>
             </a:extLst>
           </p:cNvPr>
@@ -5796,8 +6295,8 @@
         </p:nvSpPr>
         <p:spPr bwMode="auto">
           <a:xfrm>
-            <a:off x="7334048" y="1750362"/>
-            <a:ext cx="198061" cy="254691"/>
+            <a:off x="4198318" y="1966899"/>
+            <a:ext cx="559103" cy="812431"/>
           </a:xfrm>
           <a:custGeom>
             <a:avLst/>
@@ -5862,6 +6361,86 @@
               <a:gd name="connsiteY3" fmla="*/ 385943 h 385943"/>
               <a:gd name="connsiteX4" fmla="*/ 0 w 198061"/>
               <a:gd name="connsiteY4" fmla="*/ 0 h 385943"/>
+              <a:gd name="connsiteX0" fmla="*/ 2094 w 198061"/>
+              <a:gd name="connsiteY0" fmla="*/ 0 h 415302"/>
+              <a:gd name="connsiteX1" fmla="*/ 194251 w 198061"/>
+              <a:gd name="connsiteY1" fmla="*/ 29359 h 415302"/>
+              <a:gd name="connsiteX2" fmla="*/ 198061 w 198061"/>
+              <a:gd name="connsiteY2" fmla="*/ 415302 h 415302"/>
+              <a:gd name="connsiteX3" fmla="*/ 0 w 198061"/>
+              <a:gd name="connsiteY3" fmla="*/ 415302 h 415302"/>
+              <a:gd name="connsiteX4" fmla="*/ 2094 w 198061"/>
+              <a:gd name="connsiteY4" fmla="*/ 0 h 415302"/>
+              <a:gd name="connsiteX0" fmla="*/ 2094 w 203673"/>
+              <a:gd name="connsiteY0" fmla="*/ 0 h 415302"/>
+              <a:gd name="connsiteX1" fmla="*/ 203673 w 203673"/>
+              <a:gd name="connsiteY1" fmla="*/ 122329 h 415302"/>
+              <a:gd name="connsiteX2" fmla="*/ 198061 w 203673"/>
+              <a:gd name="connsiteY2" fmla="*/ 415302 h 415302"/>
+              <a:gd name="connsiteX3" fmla="*/ 0 w 203673"/>
+              <a:gd name="connsiteY3" fmla="*/ 415302 h 415302"/>
+              <a:gd name="connsiteX4" fmla="*/ 2094 w 203673"/>
+              <a:gd name="connsiteY4" fmla="*/ 0 h 415302"/>
+              <a:gd name="connsiteX0" fmla="*/ 0 w 206697"/>
+              <a:gd name="connsiteY0" fmla="*/ 0 h 463511"/>
+              <a:gd name="connsiteX1" fmla="*/ 206697 w 206697"/>
+              <a:gd name="connsiteY1" fmla="*/ 170538 h 463511"/>
+              <a:gd name="connsiteX2" fmla="*/ 201085 w 206697"/>
+              <a:gd name="connsiteY2" fmla="*/ 463511 h 463511"/>
+              <a:gd name="connsiteX3" fmla="*/ 3024 w 206697"/>
+              <a:gd name="connsiteY3" fmla="*/ 463511 h 463511"/>
+              <a:gd name="connsiteX4" fmla="*/ 0 w 206697"/>
+              <a:gd name="connsiteY4" fmla="*/ 0 h 463511"/>
+              <a:gd name="connsiteX0" fmla="*/ 0 w 204138"/>
+              <a:gd name="connsiteY0" fmla="*/ 0 h 463511"/>
+              <a:gd name="connsiteX1" fmla="*/ 204138 w 204138"/>
+              <a:gd name="connsiteY1" fmla="*/ 270171 h 463511"/>
+              <a:gd name="connsiteX2" fmla="*/ 201085 w 204138"/>
+              <a:gd name="connsiteY2" fmla="*/ 463511 h 463511"/>
+              <a:gd name="connsiteX3" fmla="*/ 3024 w 204138"/>
+              <a:gd name="connsiteY3" fmla="*/ 463511 h 463511"/>
+              <a:gd name="connsiteX4" fmla="*/ 0 w 204138"/>
+              <a:gd name="connsiteY4" fmla="*/ 0 h 463511"/>
+              <a:gd name="connsiteX0" fmla="*/ 0 w 201316"/>
+              <a:gd name="connsiteY0" fmla="*/ 0 h 463511"/>
+              <a:gd name="connsiteX1" fmla="*/ 200394 w 201316"/>
+              <a:gd name="connsiteY1" fmla="*/ 226697 h 463511"/>
+              <a:gd name="connsiteX2" fmla="*/ 201085 w 201316"/>
+              <a:gd name="connsiteY2" fmla="*/ 463511 h 463511"/>
+              <a:gd name="connsiteX3" fmla="*/ 3024 w 201316"/>
+              <a:gd name="connsiteY3" fmla="*/ 463511 h 463511"/>
+              <a:gd name="connsiteX4" fmla="*/ 0 w 201316"/>
+              <a:gd name="connsiteY4" fmla="*/ 0 h 463511"/>
+              <a:gd name="connsiteX0" fmla="*/ 0 w 206010"/>
+              <a:gd name="connsiteY0" fmla="*/ 0 h 463511"/>
+              <a:gd name="connsiteX1" fmla="*/ 206010 w 206010"/>
+              <a:gd name="connsiteY1" fmla="*/ 148444 h 463511"/>
+              <a:gd name="connsiteX2" fmla="*/ 201085 w 206010"/>
+              <a:gd name="connsiteY2" fmla="*/ 463511 h 463511"/>
+              <a:gd name="connsiteX3" fmla="*/ 3024 w 206010"/>
+              <a:gd name="connsiteY3" fmla="*/ 463511 h 463511"/>
+              <a:gd name="connsiteX4" fmla="*/ 0 w 206010"/>
+              <a:gd name="connsiteY4" fmla="*/ 0 h 463511"/>
+              <a:gd name="connsiteX0" fmla="*/ 0 w 206010"/>
+              <a:gd name="connsiteY0" fmla="*/ 0 h 463511"/>
+              <a:gd name="connsiteX1" fmla="*/ 206010 w 206010"/>
+              <a:gd name="connsiteY1" fmla="*/ 148444 h 463511"/>
+              <a:gd name="connsiteX2" fmla="*/ 201085 w 206010"/>
+              <a:gd name="connsiteY2" fmla="*/ 463511 h 463511"/>
+              <a:gd name="connsiteX3" fmla="*/ 3024 w 206010"/>
+              <a:gd name="connsiteY3" fmla="*/ 463511 h 463511"/>
+              <a:gd name="connsiteX4" fmla="*/ 0 w 206010"/>
+              <a:gd name="connsiteY4" fmla="*/ 0 h 463511"/>
+              <a:gd name="connsiteX0" fmla="*/ 0 w 206010"/>
+              <a:gd name="connsiteY0" fmla="*/ 0 h 463511"/>
+              <a:gd name="connsiteX1" fmla="*/ 206010 w 206010"/>
+              <a:gd name="connsiteY1" fmla="*/ 148444 h 463511"/>
+              <a:gd name="connsiteX2" fmla="*/ 201085 w 206010"/>
+              <a:gd name="connsiteY2" fmla="*/ 463511 h 463511"/>
+              <a:gd name="connsiteX3" fmla="*/ 3024 w 206010"/>
+              <a:gd name="connsiteY3" fmla="*/ 463511 h 463511"/>
+              <a:gd name="connsiteX4" fmla="*/ 0 w 206010"/>
+              <a:gd name="connsiteY4" fmla="*/ 0 h 463511"/>
             </a:gdLst>
             <a:ahLst/>
             <a:cxnLst>
@@ -5883,20 +6462,24 @@
             </a:cxnLst>
             <a:rect l="l" t="t" r="r" b="b"/>
             <a:pathLst>
-              <a:path w="198061" h="385943">
+              <a:path w="206010" h="463511">
                 <a:moveTo>
                   <a:pt x="0" y="0"/>
                 </a:moveTo>
-                <a:lnTo>
-                  <a:pt x="194251" y="0"/>
-                </a:lnTo>
-                <a:lnTo>
-                  <a:pt x="198061" y="385943"/>
-                </a:lnTo>
                 <a:cubicBezTo>
-                  <a:pt x="55841" y="244973"/>
-                  <a:pt x="140315" y="260213"/>
-                  <a:pt x="0" y="385943"/>
+                  <a:pt x="87388" y="66871"/>
+                  <a:pt x="114879" y="81573"/>
+                  <a:pt x="206010" y="148444"/>
+                </a:cubicBezTo>
+                <a:cubicBezTo>
+                  <a:pt x="204992" y="212891"/>
+                  <a:pt x="202103" y="399064"/>
+                  <a:pt x="201085" y="463511"/>
+                </a:cubicBezTo>
+                <a:cubicBezTo>
+                  <a:pt x="58865" y="322541"/>
+                  <a:pt x="143339" y="337781"/>
+                  <a:pt x="3024" y="463511"/>
                 </a:cubicBezTo>
                 <a:lnTo>
                   <a:pt x="0" y="0"/>
@@ -5941,7 +6524,7 @@
               <a:buNone/>
               <a:tabLst/>
             </a:pPr>
-            <a:endParaRPr kumimoji="0" lang="pt-PT" sz="2500" b="0" i="0" u="none" strike="noStrike" cap="none" normalizeH="0" baseline="0">
+            <a:endParaRPr kumimoji="0" lang="pt-PT" sz="2500" b="0" i="0" u="none" strike="noStrike" cap="none" normalizeH="0" baseline="0" dirty="0">
               <a:ln>
                 <a:noFill/>
               </a:ln>
@@ -5956,115 +6539,217 @@
       </p:sp>
       <p:pic>
         <p:nvPicPr>
-          <p:cNvPr id="36" name="Imagem 35" descr="Uma imagem com texto, interior, Dispositivo de visualização, Computador tablet&#10;&#10;Descrição gerada automaticamente">
+          <p:cNvPr id="1032" name="Picture 8">
             <a:extLst>
               <a:ext uri="{FF2B5EF4-FFF2-40B4-BE49-F238E27FC236}">
-                <a16:creationId xmlns:a16="http://schemas.microsoft.com/office/drawing/2014/main" id="{FA87D7E0-9032-75A2-D079-4AC6340DBBE1}"/>
+                <a16:creationId xmlns:a16="http://schemas.microsoft.com/office/drawing/2014/main" id="{18F7CFF7-AAC9-5205-BC61-EA7AEE6954DD}"/>
               </a:ext>
             </a:extLst>
           </p:cNvPr>
           <p:cNvPicPr>
-            <a:picLocks noChangeAspect="1"/>
+            <a:picLocks noChangeAspect="1" noChangeArrowheads="1"/>
           </p:cNvPicPr>
           <p:nvPr/>
         </p:nvPicPr>
         <p:blipFill>
-          <a:blip r:embed="rId15" cstate="print">
+          <a:blip r:embed="rId7" cstate="print">
             <a:extLst>
               <a:ext uri="{28A0092B-C50C-407E-A947-70E740481C1C}">
                 <a14:useLocalDpi xmlns:a14="http://schemas.microsoft.com/office/drawing/2010/main" val="0"/>
               </a:ext>
             </a:extLst>
           </a:blip>
+          <a:srcRect/>
           <a:stretch>
             <a:fillRect/>
           </a:stretch>
         </p:blipFill>
-        <p:spPr>
+        <p:spPr bwMode="auto">
           <a:xfrm>
-            <a:off x="4560248" y="3436514"/>
-            <a:ext cx="2626387" cy="1465368"/>
+            <a:off x="8192054" y="5143153"/>
+            <a:ext cx="2852598" cy="1135174"/>
           </a:xfrm>
           <a:prstGeom prst="rect">
             <a:avLst/>
           </a:prstGeom>
+          <a:noFill/>
+          <a:extLst>
+            <a:ext uri="{909E8E84-426E-40DD-AFC4-6F175D3DCCD1}">
+              <a14:hiddenFill xmlns:a14="http://schemas.microsoft.com/office/drawing/2010/main">
+                <a:solidFill>
+                  <a:srgbClr val="FFFFFF"/>
+                </a:solidFill>
+              </a14:hiddenFill>
+            </a:ext>
+          </a:extLst>
         </p:spPr>
       </p:pic>
       <p:sp>
         <p:nvSpPr>
-          <p:cNvPr id="38" name="Retângulo 37">
+          <p:cNvPr id="55" name="CaixaDeTexto 54">
             <a:extLst>
               <a:ext uri="{FF2B5EF4-FFF2-40B4-BE49-F238E27FC236}">
-                <a16:creationId xmlns:a16="http://schemas.microsoft.com/office/drawing/2014/main" id="{382CD395-0568-D694-F718-FA25EAAB0783}"/>
+                <a16:creationId xmlns:a16="http://schemas.microsoft.com/office/drawing/2014/main" id="{C3FB2F0D-91F9-92CA-A4FF-B4436108848C}"/>
               </a:ext>
             </a:extLst>
           </p:cNvPr>
-          <p:cNvSpPr/>
+          <p:cNvSpPr txBox="1"/>
           <p:nvPr/>
         </p:nvSpPr>
-        <p:spPr bwMode="auto">
+        <p:spPr>
           <a:xfrm>
-            <a:off x="-4440" y="9240118"/>
-            <a:ext cx="12806040" cy="361082"/>
+            <a:off x="11052858" y="5206623"/>
+            <a:ext cx="1589242" cy="600164"/>
           </a:xfrm>
           <a:prstGeom prst="rect">
             <a:avLst/>
           </a:prstGeom>
-          <a:solidFill>
-            <a:srgbClr val="165A69"/>
-          </a:solidFill>
-          <a:ln w="9525" cap="flat" cmpd="sng" algn="ctr">
-            <a:noFill/>
-            <a:prstDash val="solid"/>
-            <a:round/>
-            <a:headEnd type="none" w="med" len="med"/>
-            <a:tailEnd type="none" w="med" len="med"/>
-          </a:ln>
-          <a:effectLst/>
-        </p:spPr>
-        <p:txBody>
-          <a:bodyPr vert="horz" wrap="square" lIns="91440" tIns="45720" rIns="91440" bIns="45720" numCol="1" rtlCol="0" anchor="t" anchorCtr="0" compatLnSpc="1">
-            <a:prstTxWarp prst="textNoShape">
-              <a:avLst/>
-            </a:prstTxWarp>
+          <a:noFill/>
+        </p:spPr>
+        <p:txBody>
+          <a:bodyPr wrap="square" rtlCol="0">
+            <a:spAutoFit/>
           </a:bodyPr>
           <a:lstStyle/>
           <a:p>
-            <a:pPr marL="0" marR="0" indent="0" algn="l" defTabSz="1279525" rtl="0" eaLnBrk="1" fontAlgn="base" latinLnBrk="0" hangingPunct="1">
-              <a:lnSpc>
-                <a:spcPct val="100000"/>
-              </a:lnSpc>
-              <a:spcBef>
-                <a:spcPct val="0"/>
-              </a:spcBef>
-              <a:spcAft>
-                <a:spcPct val="0"/>
-              </a:spcAft>
-              <a:buClrTx/>
-              <a:buSzTx/>
-              <a:buFontTx/>
-              <a:buNone/>
-              <a:tabLst/>
-            </a:pPr>
-            <a:r>
-              <a:rPr lang="pt-PT" sz="1600" dirty="0">
+            <a:pPr algn="just"/>
+            <a:r>
+              <a:rPr lang="pt-PT" sz="1100" b="1" dirty="0">
                 <a:solidFill>
-                  <a:schemeClr val="bg1"/>
+                  <a:srgbClr val="165A69"/>
                 </a:solidFill>
-                <a:latin typeface="Arial" panose="020B0604020202020204" pitchFamily="34" charset="0"/>
               </a:rPr>
-              <a:t>Licenciatura em Engenharia Informática – Projeto Informático					2023/2024</a:t>
-            </a:r>
-            <a:endParaRPr kumimoji="0" lang="pt-PT" sz="1600" b="0" i="0" u="none" strike="noStrike" cap="none" normalizeH="0" baseline="0" dirty="0">
-              <a:ln>
-                <a:noFill/>
-              </a:ln>
-              <a:solidFill>
-                <a:schemeClr val="bg1"/>
-              </a:solidFill>
-              <a:effectLst/>
-              <a:latin typeface="Arial" panose="020B0604020202020204" pitchFamily="34" charset="0"/>
-            </a:endParaRPr>
+              <a:t>Figura 1 - </a:t>
+            </a:r>
+            <a:r>
+              <a:rPr lang="pt-PT" sz="1100" dirty="0"/>
+              <a:t>Mecânica implementada no jogo de memória</a:t>
+            </a:r>
+          </a:p>
+        </p:txBody>
+      </p:sp>
+      <p:sp>
+        <p:nvSpPr>
+          <p:cNvPr id="56" name="CaixaDeTexto 55">
+            <a:extLst>
+              <a:ext uri="{FF2B5EF4-FFF2-40B4-BE49-F238E27FC236}">
+                <a16:creationId xmlns:a16="http://schemas.microsoft.com/office/drawing/2014/main" id="{A20AC705-C0D8-8D5F-3E20-B24901A00469}"/>
+              </a:ext>
+            </a:extLst>
+          </p:cNvPr>
+          <p:cNvSpPr txBox="1"/>
+          <p:nvPr/>
+        </p:nvSpPr>
+        <p:spPr>
+          <a:xfrm>
+            <a:off x="8204115" y="6791635"/>
+            <a:ext cx="2282950" cy="600164"/>
+          </a:xfrm>
+          <a:prstGeom prst="rect">
+            <a:avLst/>
+          </a:prstGeom>
+          <a:noFill/>
+        </p:spPr>
+        <p:txBody>
+          <a:bodyPr wrap="square" rtlCol="0">
+            <a:spAutoFit/>
+          </a:bodyPr>
+          <a:lstStyle/>
+          <a:p>
+            <a:r>
+              <a:rPr lang="pt-PT" sz="1100" b="1" dirty="0">
+                <a:solidFill>
+                  <a:srgbClr val="165A69"/>
+                </a:solidFill>
+              </a:rPr>
+              <a:t>Figura 2 - </a:t>
+            </a:r>
+            <a:r>
+              <a:rPr lang="pt-PT" sz="1100" dirty="0"/>
+              <a:t>Mecânica implementada para recompensar o jogador</a:t>
+            </a:r>
+          </a:p>
+        </p:txBody>
+      </p:sp>
+      <p:sp>
+        <p:nvSpPr>
+          <p:cNvPr id="57" name="CaixaDeTexto 56">
+            <a:extLst>
+              <a:ext uri="{FF2B5EF4-FFF2-40B4-BE49-F238E27FC236}">
+                <a16:creationId xmlns:a16="http://schemas.microsoft.com/office/drawing/2014/main" id="{581FBB6F-E729-6C31-DE65-A27939A521D2}"/>
+              </a:ext>
+            </a:extLst>
+          </p:cNvPr>
+          <p:cNvSpPr txBox="1"/>
+          <p:nvPr/>
+        </p:nvSpPr>
+        <p:spPr>
+          <a:xfrm>
+            <a:off x="11062408" y="7114261"/>
+            <a:ext cx="731469" cy="261610"/>
+          </a:xfrm>
+          <a:prstGeom prst="rect">
+            <a:avLst/>
+          </a:prstGeom>
+          <a:noFill/>
+        </p:spPr>
+        <p:txBody>
+          <a:bodyPr wrap="square" rtlCol="0">
+            <a:spAutoFit/>
+          </a:bodyPr>
+          <a:lstStyle/>
+          <a:p>
+            <a:pPr algn="just"/>
+            <a:r>
+              <a:rPr lang="pt-PT" sz="1100" b="1" dirty="0">
+                <a:solidFill>
+                  <a:srgbClr val="165A69"/>
+                </a:solidFill>
+              </a:rPr>
+              <a:t>Figura 2</a:t>
+            </a:r>
+            <a:endParaRPr lang="pt-PT" sz="1100" dirty="0"/>
+          </a:p>
+        </p:txBody>
+      </p:sp>
+      <p:sp>
+        <p:nvSpPr>
+          <p:cNvPr id="58" name="CaixaDeTexto 57">
+            <a:extLst>
+              <a:ext uri="{FF2B5EF4-FFF2-40B4-BE49-F238E27FC236}">
+                <a16:creationId xmlns:a16="http://schemas.microsoft.com/office/drawing/2014/main" id="{D5DC5B2C-E6C4-2F14-888C-8871BB4BC302}"/>
+              </a:ext>
+            </a:extLst>
+          </p:cNvPr>
+          <p:cNvSpPr txBox="1"/>
+          <p:nvPr/>
+        </p:nvSpPr>
+        <p:spPr>
+          <a:xfrm>
+            <a:off x="8929730" y="6054597"/>
+            <a:ext cx="731469" cy="261610"/>
+          </a:xfrm>
+          <a:prstGeom prst="rect">
+            <a:avLst/>
+          </a:prstGeom>
+          <a:noFill/>
+        </p:spPr>
+        <p:txBody>
+          <a:bodyPr wrap="square" rtlCol="0">
+            <a:spAutoFit/>
+          </a:bodyPr>
+          <a:lstStyle/>
+          <a:p>
+            <a:pPr algn="just"/>
+            <a:r>
+              <a:rPr lang="pt-PT" sz="1100" b="1" dirty="0">
+                <a:solidFill>
+                  <a:srgbClr val="165A69"/>
+                </a:solidFill>
+              </a:rPr>
+              <a:t>Figura 1</a:t>
+            </a:r>
+            <a:endParaRPr lang="pt-PT" sz="1100" dirty="0"/>
           </a:p>
         </p:txBody>
       </p:sp>

</xml_diff>